<commit_message>
Nederlandse versie van presentatie gemaakt
</commit_message>
<xml_diff>
--- a/docs/Presentation CPB Zipfs law PDF ready.pptx
+++ b/docs/Presentation CPB Zipfs law PDF ready.pptx
@@ -2392,10 +2392,10 @@
         <a:lstStyle/>
         <a:p>
           <a:r>
-            <a:rPr lang="en-US" sz="3600" dirty="0" smtClean="0"/>
-            <a:t>Job attractiveness</a:t>
+            <a:rPr lang="nl-NL" sz="3200" smtClean="0"/>
+            <a:t>Aantrekkelijkheid werk</a:t>
           </a:r>
-          <a:endParaRPr lang="en-US" sz="3600" dirty="0"/>
+          <a:endParaRPr lang="en-US" sz="3200" dirty="0"/>
         </a:p>
       </dgm:t>
     </dgm:pt>
@@ -2429,16 +2429,10 @@
         <a:lstStyle/>
         <a:p>
           <a:r>
-            <a:rPr lang="en-US" sz="2000" dirty="0" smtClean="0"/>
-            <a:t>Primary </a:t>
+            <a:rPr lang="en-US" sz="2000" smtClean="0"/>
+            <a:t>Primaire sector banen</a:t>
           </a:r>
-        </a:p>
-        <a:p>
-          <a:r>
-            <a:rPr lang="en-US" sz="2000" dirty="0" smtClean="0"/>
-            <a:t>sector jobs</a:t>
-          </a:r>
-          <a:endParaRPr lang="en-US" sz="2000" dirty="0"/>
+          <a:endParaRPr lang="en-US" sz="2000" dirty="0" smtClean="0"/>
         </a:p>
       </dgm:t>
     </dgm:pt>
@@ -2928,10 +2922,10 @@
         <a:lstStyle/>
         <a:p>
           <a:r>
-            <a:rPr lang="en-US" sz="3600" dirty="0" smtClean="0"/>
-            <a:t>Job attractiveness</a:t>
+            <a:rPr lang="en-US" sz="3200" smtClean="0"/>
+            <a:t>Aantrekkelijkheid werk</a:t>
           </a:r>
-          <a:endParaRPr lang="en-US" sz="3600" dirty="0"/>
+          <a:endParaRPr lang="en-US" sz="3200" dirty="0"/>
         </a:p>
       </dgm:t>
     </dgm:pt>
@@ -3020,24 +3014,14 @@
         <a:lstStyle/>
         <a:p>
           <a:r>
-            <a:rPr lang="en-US" sz="2000" dirty="0" smtClean="0">
+            <a:rPr lang="en-US" sz="2000" smtClean="0">
               <a:solidFill>
                 <a:schemeClr val="bg1"/>
               </a:solidFill>
             </a:rPr>
-            <a:t>Secondary </a:t>
+            <a:t>Secondaire sector banen</a:t>
           </a:r>
-        </a:p>
-        <a:p>
-          <a:r>
-            <a:rPr lang="en-US" sz="2000" dirty="0" smtClean="0">
-              <a:solidFill>
-                <a:schemeClr val="bg1"/>
-              </a:solidFill>
-            </a:rPr>
-            <a:t>sector jobs</a:t>
-          </a:r>
-          <a:endParaRPr lang="en-US" sz="2000" dirty="0">
+          <a:endParaRPr lang="en-US" sz="2000" dirty="0" smtClean="0">
             <a:solidFill>
               <a:schemeClr val="bg1"/>
             </a:solidFill>
@@ -3130,22 +3114,35 @@
         <a:lstStyle/>
         <a:p>
           <a:r>
-            <a:rPr lang="en-US" sz="2000" dirty="0" smtClean="0">
+            <a:rPr lang="en-US" sz="2000" smtClean="0">
               <a:solidFill>
                 <a:schemeClr val="bg1"/>
               </a:solidFill>
             </a:rPr>
-            <a:t>Quaternary </a:t>
+            <a:t>Quaternaire </a:t>
           </a:r>
+          <a:endParaRPr lang="en-US" sz="2000" dirty="0" smtClean="0">
+            <a:solidFill>
+              <a:schemeClr val="bg1"/>
+            </a:solidFill>
+          </a:endParaRPr>
         </a:p>
         <a:p>
           <a:r>
-            <a:rPr lang="en-US" sz="2000" dirty="0" smtClean="0">
+            <a:rPr lang="en-US" sz="2000" smtClean="0">
               <a:solidFill>
                 <a:schemeClr val="bg1"/>
               </a:solidFill>
             </a:rPr>
-            <a:t>sector jobs</a:t>
+            <a:t>sector </a:t>
+          </a:r>
+          <a:r>
+            <a:rPr lang="en-US" sz="2000" smtClean="0">
+              <a:solidFill>
+                <a:schemeClr val="bg1"/>
+              </a:solidFill>
+            </a:rPr>
+            <a:t>banen</a:t>
           </a:r>
           <a:endParaRPr lang="en-US" sz="2000" dirty="0">
             <a:solidFill>
@@ -3476,10 +3473,10 @@
         <a:lstStyle/>
         <a:p>
           <a:r>
-            <a:rPr lang="en-US" sz="3600" dirty="0" smtClean="0"/>
-            <a:t>Job attractiveness</a:t>
+            <a:rPr lang="nl-NL" sz="3200" smtClean="0"/>
+            <a:t>Aantrekkelijkheid werk</a:t>
           </a:r>
-          <a:endParaRPr lang="en-US" sz="3600" dirty="0"/>
+          <a:endParaRPr lang="en-US" sz="3200" dirty="0"/>
         </a:p>
       </dgm:t>
     </dgm:pt>
@@ -3623,22 +3620,35 @@
         <a:lstStyle/>
         <a:p>
           <a:r>
-            <a:rPr lang="en-US" sz="2000" dirty="0" smtClean="0">
+            <a:rPr lang="en-US" sz="2000" smtClean="0">
               <a:solidFill>
                 <a:schemeClr val="bg1"/>
               </a:solidFill>
             </a:rPr>
-            <a:t>Tertiary </a:t>
+            <a:t>Tertiare</a:t>
           </a:r>
+          <a:endParaRPr lang="en-US" sz="2000" dirty="0" smtClean="0">
+            <a:solidFill>
+              <a:schemeClr val="bg1"/>
+            </a:solidFill>
+          </a:endParaRPr>
         </a:p>
         <a:p>
           <a:r>
-            <a:rPr lang="en-US" sz="2000" dirty="0" smtClean="0">
+            <a:rPr lang="en-US" sz="2000" smtClean="0">
               <a:solidFill>
                 <a:schemeClr val="bg1"/>
               </a:solidFill>
             </a:rPr>
-            <a:t>sector jobs</a:t>
+            <a:t>sector </a:t>
+          </a:r>
+          <a:r>
+            <a:rPr lang="en-US" sz="2000" smtClean="0">
+              <a:solidFill>
+                <a:schemeClr val="bg1"/>
+              </a:solidFill>
+            </a:rPr>
+            <a:t>banen</a:t>
           </a:r>
           <a:endParaRPr lang="en-US" sz="2000" dirty="0">
             <a:solidFill>
@@ -4399,12 +4409,12 @@
         </a:fontRef>
       </dsp:style>
       <dsp:txBody>
-        <a:bodyPr spcFirstLastPara="0" vert="horz" wrap="square" lIns="22860" tIns="22860" rIns="22860" bIns="22860" numCol="1" spcCol="1270" anchor="ctr" anchorCtr="0">
+        <a:bodyPr spcFirstLastPara="0" vert="horz" wrap="square" lIns="20320" tIns="20320" rIns="20320" bIns="20320" numCol="1" spcCol="1270" anchor="ctr" anchorCtr="0">
           <a:noAutofit/>
         </a:bodyPr>
         <a:lstStyle/>
         <a:p>
-          <a:pPr lvl="0" algn="ctr" defTabSz="1600200">
+          <a:pPr lvl="0" algn="ctr" defTabSz="1422400">
             <a:lnSpc>
               <a:spcPct val="90000"/>
             </a:lnSpc>
@@ -4416,10 +4426,10 @@
             </a:spcAft>
           </a:pPr>
           <a:r>
-            <a:rPr lang="en-US" sz="3600" kern="1200" dirty="0" smtClean="0"/>
-            <a:t>Job attractiveness</a:t>
+            <a:rPr lang="nl-NL" sz="3200" kern="1200" smtClean="0"/>
+            <a:t>Aantrekkelijkheid werk</a:t>
           </a:r>
-          <a:endParaRPr lang="en-US" sz="3600" kern="1200" dirty="0"/>
+          <a:endParaRPr lang="en-US" sz="3200" kern="1200" dirty="0"/>
         </a:p>
       </dsp:txBody>
       <dsp:txXfrm>
@@ -4493,27 +4503,10 @@
             </a:spcAft>
           </a:pPr>
           <a:r>
-            <a:rPr lang="en-US" sz="2000" kern="1200" dirty="0" smtClean="0"/>
-            <a:t>Primary </a:t>
+            <a:rPr lang="en-US" sz="2000" kern="1200" smtClean="0"/>
+            <a:t>Primaire sector banen</a:t>
           </a:r>
-        </a:p>
-        <a:p>
-          <a:pPr lvl="0" algn="ctr" defTabSz="889000">
-            <a:lnSpc>
-              <a:spcPct val="90000"/>
-            </a:lnSpc>
-            <a:spcBef>
-              <a:spcPct val="0"/>
-            </a:spcBef>
-            <a:spcAft>
-              <a:spcPct val="35000"/>
-            </a:spcAft>
-          </a:pPr>
-          <a:r>
-            <a:rPr lang="en-US" sz="2000" kern="1200" dirty="0" smtClean="0"/>
-            <a:t>sector jobs</a:t>
-          </a:r>
-          <a:endParaRPr lang="en-US" sz="2000" kern="1200" dirty="0"/>
+          <a:endParaRPr lang="en-US" sz="2000" kern="1200" dirty="0" smtClean="0"/>
         </a:p>
       </dsp:txBody>
       <dsp:txXfrm>
@@ -5240,12 +5233,12 @@
         </a:fontRef>
       </dsp:style>
       <dsp:txBody>
-        <a:bodyPr spcFirstLastPara="0" vert="horz" wrap="square" lIns="22860" tIns="22860" rIns="22860" bIns="22860" numCol="1" spcCol="1270" anchor="ctr" anchorCtr="0">
+        <a:bodyPr spcFirstLastPara="0" vert="horz" wrap="square" lIns="20320" tIns="20320" rIns="20320" bIns="20320" numCol="1" spcCol="1270" anchor="ctr" anchorCtr="0">
           <a:noAutofit/>
         </a:bodyPr>
         <a:lstStyle/>
         <a:p>
-          <a:pPr lvl="0" algn="ctr" defTabSz="1600200">
+          <a:pPr lvl="0" algn="ctr" defTabSz="1422400">
             <a:lnSpc>
               <a:spcPct val="90000"/>
             </a:lnSpc>
@@ -5257,10 +5250,10 @@
             </a:spcAft>
           </a:pPr>
           <a:r>
-            <a:rPr lang="en-US" sz="3600" kern="1200" dirty="0" smtClean="0"/>
-            <a:t>Job attractiveness</a:t>
+            <a:rPr lang="en-US" sz="3200" kern="1200" smtClean="0"/>
+            <a:t>Aantrekkelijkheid werk</a:t>
           </a:r>
-          <a:endParaRPr lang="en-US" sz="3600" kern="1200" dirty="0"/>
+          <a:endParaRPr lang="en-US" sz="3200" kern="1200" dirty="0"/>
         </a:p>
       </dsp:txBody>
       <dsp:txXfrm>
@@ -5440,35 +5433,14 @@
             </a:spcAft>
           </a:pPr>
           <a:r>
-            <a:rPr lang="en-US" sz="2000" kern="1200" dirty="0" smtClean="0">
+            <a:rPr lang="en-US" sz="2000" kern="1200" smtClean="0">
               <a:solidFill>
                 <a:schemeClr val="bg1"/>
               </a:solidFill>
             </a:rPr>
-            <a:t>Secondary </a:t>
+            <a:t>Secondaire sector banen</a:t>
           </a:r>
-        </a:p>
-        <a:p>
-          <a:pPr lvl="0" algn="ctr" defTabSz="889000">
-            <a:lnSpc>
-              <a:spcPct val="90000"/>
-            </a:lnSpc>
-            <a:spcBef>
-              <a:spcPct val="0"/>
-            </a:spcBef>
-            <a:spcAft>
-              <a:spcPct val="35000"/>
-            </a:spcAft>
-          </a:pPr>
-          <a:r>
-            <a:rPr lang="en-US" sz="2000" kern="1200" dirty="0" smtClean="0">
-              <a:solidFill>
-                <a:schemeClr val="bg1"/>
-              </a:solidFill>
-            </a:rPr>
-            <a:t>sector jobs</a:t>
-          </a:r>
-          <a:endParaRPr lang="en-US" sz="2000" kern="1200" dirty="0">
+          <a:endParaRPr lang="en-US" sz="2000" kern="1200" dirty="0" smtClean="0">
             <a:solidFill>
               <a:schemeClr val="bg1"/>
             </a:solidFill>
@@ -5652,13 +5624,18 @@
             </a:spcAft>
           </a:pPr>
           <a:r>
-            <a:rPr lang="en-US" sz="2000" kern="1200" dirty="0" smtClean="0">
+            <a:rPr lang="en-US" sz="2000" kern="1200" smtClean="0">
               <a:solidFill>
                 <a:schemeClr val="bg1"/>
               </a:solidFill>
             </a:rPr>
-            <a:t>Quaternary </a:t>
+            <a:t>Quaternaire </a:t>
           </a:r>
+          <a:endParaRPr lang="en-US" sz="2000" kern="1200" dirty="0" smtClean="0">
+            <a:solidFill>
+              <a:schemeClr val="bg1"/>
+            </a:solidFill>
+          </a:endParaRPr>
         </a:p>
         <a:p>
           <a:pPr lvl="0" algn="ctr" defTabSz="889000">
@@ -5673,12 +5650,20 @@
             </a:spcAft>
           </a:pPr>
           <a:r>
-            <a:rPr lang="en-US" sz="2000" kern="1200" dirty="0" smtClean="0">
+            <a:rPr lang="en-US" sz="2000" kern="1200" smtClean="0">
               <a:solidFill>
                 <a:schemeClr val="bg1"/>
               </a:solidFill>
             </a:rPr>
-            <a:t>sector jobs</a:t>
+            <a:t>sector </a:t>
+          </a:r>
+          <a:r>
+            <a:rPr lang="en-US" sz="2000" kern="1200" smtClean="0">
+              <a:solidFill>
+                <a:schemeClr val="bg1"/>
+              </a:solidFill>
+            </a:rPr>
+            <a:t>banen</a:t>
           </a:r>
           <a:endParaRPr lang="en-US" sz="2000" kern="1200" dirty="0">
             <a:solidFill>
@@ -6093,12 +6078,12 @@
         </a:fontRef>
       </dsp:style>
       <dsp:txBody>
-        <a:bodyPr spcFirstLastPara="0" vert="horz" wrap="square" lIns="22860" tIns="22860" rIns="22860" bIns="22860" numCol="1" spcCol="1270" anchor="ctr" anchorCtr="0">
+        <a:bodyPr spcFirstLastPara="0" vert="horz" wrap="square" lIns="20320" tIns="20320" rIns="20320" bIns="20320" numCol="1" spcCol="1270" anchor="ctr" anchorCtr="0">
           <a:noAutofit/>
         </a:bodyPr>
         <a:lstStyle/>
         <a:p>
-          <a:pPr lvl="0" algn="ctr" defTabSz="1600200">
+          <a:pPr lvl="0" algn="ctr" defTabSz="1422400">
             <a:lnSpc>
               <a:spcPct val="90000"/>
             </a:lnSpc>
@@ -6110,10 +6095,10 @@
             </a:spcAft>
           </a:pPr>
           <a:r>
-            <a:rPr lang="en-US" sz="3600" kern="1200" dirty="0" smtClean="0"/>
-            <a:t>Job attractiveness</a:t>
+            <a:rPr lang="nl-NL" sz="3200" kern="1200" smtClean="0"/>
+            <a:t>Aantrekkelijkheid werk</a:t>
           </a:r>
-          <a:endParaRPr lang="en-US" sz="3600" kern="1200" dirty="0"/>
+          <a:endParaRPr lang="en-US" sz="3200" kern="1200" dirty="0"/>
         </a:p>
       </dsp:txBody>
       <dsp:txXfrm>
@@ -6399,13 +6384,18 @@
             </a:spcAft>
           </a:pPr>
           <a:r>
-            <a:rPr lang="en-US" sz="2000" kern="1200" dirty="0" smtClean="0">
+            <a:rPr lang="en-US" sz="2000" kern="1200" smtClean="0">
               <a:solidFill>
                 <a:schemeClr val="bg1"/>
               </a:solidFill>
             </a:rPr>
-            <a:t>Tertiary </a:t>
+            <a:t>Tertiare</a:t>
           </a:r>
+          <a:endParaRPr lang="en-US" sz="2000" kern="1200" dirty="0" smtClean="0">
+            <a:solidFill>
+              <a:schemeClr val="bg1"/>
+            </a:solidFill>
+          </a:endParaRPr>
         </a:p>
         <a:p>
           <a:pPr lvl="0" algn="ctr" defTabSz="889000">
@@ -6420,12 +6410,20 @@
             </a:spcAft>
           </a:pPr>
           <a:r>
-            <a:rPr lang="en-US" sz="2000" kern="1200" dirty="0" smtClean="0">
+            <a:rPr lang="en-US" sz="2000" kern="1200" smtClean="0">
               <a:solidFill>
                 <a:schemeClr val="bg1"/>
               </a:solidFill>
             </a:rPr>
-            <a:t>sector jobs</a:t>
+            <a:t>sector </a:t>
+          </a:r>
+          <a:r>
+            <a:rPr lang="en-US" sz="2000" kern="1200" smtClean="0">
+              <a:solidFill>
+                <a:schemeClr val="bg1"/>
+              </a:solidFill>
+            </a:rPr>
+            <a:t>banen</a:t>
           </a:r>
           <a:endParaRPr lang="en-US" sz="2000" kern="1200" dirty="0">
             <a:solidFill>
@@ -10759,7 +10757,7 @@
             <a:fld id="{E6F9B8CD-342D-4579-98EC-A8FD6B7370E1}" type="datetimeFigureOut">
               <a:rPr lang="en-US" smtClean="0"/>
               <a:pPr eaLnBrk="1" latinLnBrk="0" hangingPunct="1"/>
-              <a:t>28-Jan-15</a:t>
+              <a:t>10-02-15</a:t>
             </a:fld>
             <a:endParaRPr lang="en-US" dirty="0"/>
           </a:p>
@@ -11503,10 +11501,11 @@
           <a:bodyPr/>
           <a:lstStyle/>
           <a:p>
+            <a:pPr eaLnBrk="1" latinLnBrk="0" hangingPunct="1"/>
             <a:fld id="{2BBB5E19-F10A-4C2F-BF6F-11C513378A2E}" type="slidenum">
               <a:rPr kumimoji="0" lang="en-US" smtClean="0"/>
               <a:pPr eaLnBrk="1" latinLnBrk="0" hangingPunct="1"/>
-              <a:t>‹#›</a:t>
+              <a:t>‹nr.›</a:t>
             </a:fld>
             <a:endParaRPr kumimoji="0" lang="en-US" dirty="0"/>
           </a:p>
@@ -11631,7 +11630,7 @@
             <a:fld id="{E6F9B8CD-342D-4579-98EC-A8FD6B7370E1}" type="datetimeFigureOut">
               <a:rPr lang="en-US" smtClean="0"/>
               <a:pPr eaLnBrk="1" latinLnBrk="0" hangingPunct="1"/>
-              <a:t>28-Jan-15</a:t>
+              <a:t>10-02-15</a:t>
             </a:fld>
             <a:endParaRPr lang="en-US"/>
           </a:p>
@@ -11671,10 +11670,11 @@
           <a:bodyPr/>
           <a:lstStyle/>
           <a:p>
+            <a:pPr eaLnBrk="1" latinLnBrk="0" hangingPunct="1"/>
             <a:fld id="{2BBB5E19-F10A-4C2F-BF6F-11C513378A2E}" type="slidenum">
               <a:rPr kumimoji="0" lang="en-US" smtClean="0"/>
               <a:pPr eaLnBrk="1" latinLnBrk="0" hangingPunct="1"/>
-              <a:t>‹#›</a:t>
+              <a:t>‹nr.›</a:t>
             </a:fld>
             <a:endParaRPr kumimoji="0" lang="en-US"/>
           </a:p>
@@ -11809,7 +11809,7 @@
             <a:fld id="{E6F9B8CD-342D-4579-98EC-A8FD6B7370E1}" type="datetimeFigureOut">
               <a:rPr lang="en-US" smtClean="0"/>
               <a:pPr eaLnBrk="1" latinLnBrk="0" hangingPunct="1"/>
-              <a:t>28-Jan-15</a:t>
+              <a:t>10-02-15</a:t>
             </a:fld>
             <a:endParaRPr lang="en-US"/>
           </a:p>
@@ -11849,10 +11849,11 @@
           <a:bodyPr/>
           <a:lstStyle/>
           <a:p>
+            <a:pPr eaLnBrk="1" latinLnBrk="0" hangingPunct="1"/>
             <a:fld id="{2BBB5E19-F10A-4C2F-BF6F-11C513378A2E}" type="slidenum">
               <a:rPr kumimoji="0" lang="en-US" smtClean="0"/>
               <a:pPr eaLnBrk="1" latinLnBrk="0" hangingPunct="1"/>
-              <a:t>‹#›</a:t>
+              <a:t>‹nr.›</a:t>
             </a:fld>
             <a:endParaRPr kumimoji="0" lang="en-US"/>
           </a:p>
@@ -11982,7 +11983,7 @@
             <a:fld id="{E6F9B8CD-342D-4579-98EC-A8FD6B7370E1}" type="datetimeFigureOut">
               <a:rPr lang="en-US" smtClean="0"/>
               <a:pPr algn="r" eaLnBrk="1" latinLnBrk="0" hangingPunct="1"/>
-              <a:t>28-Jan-15</a:t>
+              <a:t>10-02-15</a:t>
             </a:fld>
             <a:endParaRPr lang="en-US"/>
           </a:p>
@@ -12007,7 +12008,7 @@
             <a:fld id="{2BBB5E19-F10A-4C2F-BF6F-11C513378A2E}" type="slidenum">
               <a:rPr kumimoji="0" lang="en-US" smtClean="0"/>
               <a:pPr algn="ctr" eaLnBrk="1" latinLnBrk="0" hangingPunct="1"/>
-              <a:t>‹#›</a:t>
+              <a:t>‹nr.›</a:t>
             </a:fld>
             <a:endParaRPr kumimoji="0" lang="en-US"/>
           </a:p>
@@ -12196,7 +12197,7 @@
             <a:fld id="{E6F9B8CD-342D-4579-98EC-A8FD6B7370E1}" type="datetimeFigureOut">
               <a:rPr lang="en-US" smtClean="0"/>
               <a:pPr eaLnBrk="1" latinLnBrk="0" hangingPunct="1"/>
-              <a:t>28-Jan-15</a:t>
+              <a:t>10-02-15</a:t>
             </a:fld>
             <a:endParaRPr lang="en-US"/>
           </a:p>
@@ -12937,10 +12938,11 @@
           <a:bodyPr/>
           <a:lstStyle/>
           <a:p>
+            <a:pPr eaLnBrk="1" latinLnBrk="0" hangingPunct="1"/>
             <a:fld id="{2BBB5E19-F10A-4C2F-BF6F-11C513378A2E}" type="slidenum">
               <a:rPr kumimoji="0" lang="en-US" smtClean="0"/>
               <a:pPr eaLnBrk="1" latinLnBrk="0" hangingPunct="1"/>
-              <a:t>‹#›</a:t>
+              <a:t>‹nr.›</a:t>
             </a:fld>
             <a:endParaRPr kumimoji="0" lang="en-US"/>
           </a:p>
@@ -13013,7 +13015,7 @@
             <a:fld id="{E6F9B8CD-342D-4579-98EC-A8FD6B7370E1}" type="datetimeFigureOut">
               <a:rPr lang="en-US" smtClean="0"/>
               <a:pPr eaLnBrk="1" latinLnBrk="0" hangingPunct="1"/>
-              <a:t>28-Jan-15</a:t>
+              <a:t>10-02-15</a:t>
             </a:fld>
             <a:endParaRPr lang="en-US"/>
           </a:p>
@@ -13053,10 +13055,11 @@
           <a:bodyPr/>
           <a:lstStyle/>
           <a:p>
+            <a:pPr eaLnBrk="1" latinLnBrk="0" hangingPunct="1"/>
             <a:fld id="{2BBB5E19-F10A-4C2F-BF6F-11C513378A2E}" type="slidenum">
               <a:rPr kumimoji="0" lang="en-US" smtClean="0"/>
               <a:pPr eaLnBrk="1" latinLnBrk="0" hangingPunct="1"/>
-              <a:t>‹#›</a:t>
+              <a:t>‹nr.›</a:t>
             </a:fld>
             <a:endParaRPr kumimoji="0" lang="en-US"/>
           </a:p>
@@ -13252,7 +13255,7 @@
             <a:fld id="{E6F9B8CD-342D-4579-98EC-A8FD6B7370E1}" type="datetimeFigureOut">
               <a:rPr lang="en-US" smtClean="0"/>
               <a:pPr eaLnBrk="1" latinLnBrk="0" hangingPunct="1"/>
-              <a:t>28-Jan-15</a:t>
+              <a:t>10-02-15</a:t>
             </a:fld>
             <a:endParaRPr lang="en-US"/>
           </a:p>
@@ -13292,10 +13295,11 @@
           <a:bodyPr/>
           <a:lstStyle/>
           <a:p>
+            <a:pPr eaLnBrk="1" latinLnBrk="0" hangingPunct="1"/>
             <a:fld id="{2BBB5E19-F10A-4C2F-BF6F-11C513378A2E}" type="slidenum">
               <a:rPr kumimoji="0" lang="en-US" smtClean="0"/>
               <a:pPr eaLnBrk="1" latinLnBrk="0" hangingPunct="1"/>
-              <a:t>‹#›</a:t>
+              <a:t>‹nr.›</a:t>
             </a:fld>
             <a:endParaRPr kumimoji="0" lang="en-US"/>
           </a:p>
@@ -13578,7 +13582,7 @@
             <a:fld id="{E6F9B8CD-342D-4579-98EC-A8FD6B7370E1}" type="datetimeFigureOut">
               <a:rPr lang="en-US" smtClean="0"/>
               <a:pPr algn="r" eaLnBrk="1" latinLnBrk="0" hangingPunct="1"/>
-              <a:t>28-Jan-15</a:t>
+              <a:t>10-02-15</a:t>
             </a:fld>
             <a:endParaRPr lang="en-US"/>
           </a:p>
@@ -13603,7 +13607,7 @@
             <a:fld id="{2BBB5E19-F10A-4C2F-BF6F-11C513378A2E}" type="slidenum">
               <a:rPr kumimoji="0" lang="en-US" smtClean="0"/>
               <a:pPr algn="ctr" eaLnBrk="1" latinLnBrk="0" hangingPunct="1"/>
-              <a:t>‹#›</a:t>
+              <a:t>‹nr.›</a:t>
             </a:fld>
             <a:endParaRPr kumimoji="0" lang="en-US"/>
           </a:p>
@@ -13672,7 +13676,7 @@
             <a:fld id="{E6F9B8CD-342D-4579-98EC-A8FD6B7370E1}" type="datetimeFigureOut">
               <a:rPr lang="en-US" smtClean="0"/>
               <a:pPr eaLnBrk="1" latinLnBrk="0" hangingPunct="1"/>
-              <a:t>28-Jan-15</a:t>
+              <a:t>10-02-15</a:t>
             </a:fld>
             <a:endParaRPr lang="en-US"/>
           </a:p>
@@ -13712,10 +13716,11 @@
           <a:bodyPr/>
           <a:lstStyle/>
           <a:p>
+            <a:pPr eaLnBrk="1" latinLnBrk="0" hangingPunct="1"/>
             <a:fld id="{2BBB5E19-F10A-4C2F-BF6F-11C513378A2E}" type="slidenum">
               <a:rPr kumimoji="0" lang="en-US" smtClean="0"/>
               <a:pPr eaLnBrk="1" latinLnBrk="0" hangingPunct="1"/>
-              <a:t>‹#›</a:t>
+              <a:t>‹nr.›</a:t>
             </a:fld>
             <a:endParaRPr kumimoji="0" lang="en-US"/>
           </a:p>
@@ -14192,7 +14197,7 @@
             <a:fld id="{E6F9B8CD-342D-4579-98EC-A8FD6B7370E1}" type="datetimeFigureOut">
               <a:rPr lang="en-US" smtClean="0"/>
               <a:pPr algn="r" eaLnBrk="1" latinLnBrk="0" hangingPunct="1"/>
-              <a:t>28-Jan-15</a:t>
+              <a:t>10-02-15</a:t>
             </a:fld>
             <a:endParaRPr lang="en-US" dirty="0"/>
           </a:p>
@@ -14217,7 +14222,7 @@
             <a:fld id="{2BBB5E19-F10A-4C2F-BF6F-11C513378A2E}" type="slidenum">
               <a:rPr kumimoji="0" lang="en-US" smtClean="0"/>
               <a:pPr algn="ctr" eaLnBrk="1" latinLnBrk="0" hangingPunct="1"/>
-              <a:t>‹#›</a:t>
+              <a:t>‹nr.›</a:t>
             </a:fld>
             <a:endParaRPr kumimoji="0" lang="en-US"/>
           </a:p>
@@ -14707,7 +14712,7 @@
             <a:fld id="{E6F9B8CD-342D-4579-98EC-A8FD6B7370E1}" type="datetimeFigureOut">
               <a:rPr lang="en-US" smtClean="0"/>
               <a:pPr algn="r" eaLnBrk="1" latinLnBrk="0" hangingPunct="1"/>
-              <a:t>28-Jan-15</a:t>
+              <a:t>10-02-15</a:t>
             </a:fld>
             <a:endParaRPr lang="en-US"/>
           </a:p>
@@ -14732,7 +14737,7 @@
             <a:fld id="{2BBB5E19-F10A-4C2F-BF6F-11C513378A2E}" type="slidenum">
               <a:rPr kumimoji="0" lang="en-US" smtClean="0"/>
               <a:pPr algn="ctr" eaLnBrk="1" latinLnBrk="0" hangingPunct="1"/>
-              <a:t>‹#›</a:t>
+              <a:t>‹nr.›</a:t>
             </a:fld>
             <a:endParaRPr kumimoji="0" lang="en-US"/>
           </a:p>
@@ -14956,7 +14961,7 @@
             <a:fld id="{E6F9B8CD-342D-4579-98EC-A8FD6B7370E1}" type="datetimeFigureOut">
               <a:rPr lang="en-US" smtClean="0"/>
               <a:pPr algn="r" eaLnBrk="1" latinLnBrk="0" hangingPunct="1"/>
-              <a:t>28-Jan-15</a:t>
+              <a:t>10-02-15</a:t>
             </a:fld>
             <a:endParaRPr lang="en-US" dirty="0">
               <a:solidFill>
@@ -15243,7 +15248,7 @@
             <a:fld id="{2BBB5E19-F10A-4C2F-BF6F-11C513378A2E}" type="slidenum">
               <a:rPr kumimoji="0" lang="en-US" smtClean="0"/>
               <a:pPr algn="ctr" eaLnBrk="1" latinLnBrk="0" hangingPunct="1"/>
-              <a:t>‹#›</a:t>
+              <a:t>‹nr.›</a:t>
             </a:fld>
             <a:endParaRPr kumimoji="0" lang="en-US" sz="1400" b="1" dirty="0">
               <a:solidFill>
@@ -15592,16 +15597,8 @@
           <a:lstStyle/>
           <a:p>
             <a:r>
-              <a:rPr lang="en-US" dirty="0" smtClean="0"/>
-              <a:t>City growth and </a:t>
-            </a:r>
-            <a:r>
-              <a:rPr lang="en-US" dirty="0" err="1" smtClean="0"/>
-              <a:t>Zipf’s</a:t>
-            </a:r>
-            <a:r>
-              <a:rPr lang="en-US" dirty="0" smtClean="0"/>
-              <a:t> Law</a:t>
+              <a:rPr lang="en-US" smtClean="0"/>
+              <a:t>Stedengroei &amp; Zipf’s Law</a:t>
             </a:r>
             <a:endParaRPr lang="en-US" dirty="0"/>
           </a:p>
@@ -15634,8 +15631,8 @@
           </a:p>
           <a:p>
             <a:r>
-              <a:rPr lang="en-US" dirty="0" smtClean="0"/>
-              <a:t>CPB: Bureau for Economic Policy Analysis</a:t>
+              <a:rPr lang="en-US" smtClean="0"/>
+              <a:t>CPB &amp; TU Delft</a:t>
             </a:r>
             <a:endParaRPr lang="en-US" dirty="0"/>
           </a:p>
@@ -15700,14 +15697,27 @@
             <p:ph type="title"/>
           </p:nvPr>
         </p:nvSpPr>
-        <p:spPr/>
+        <p:spPr>
+          <a:xfrm>
+            <a:off x="457200" y="274638"/>
+            <a:ext cx="8229600" cy="1143000"/>
+          </a:xfrm>
+        </p:spPr>
         <p:txBody>
           <a:bodyPr/>
           <a:lstStyle/>
           <a:p>
             <a:r>
-              <a:rPr lang="en-US" dirty="0" smtClean="0"/>
-              <a:t>Model Logic: Resistance to Move</a:t>
+              <a:rPr lang="en-US" smtClean="0"/>
+              <a:t>Model </a:t>
+            </a:r>
+            <a:r>
+              <a:rPr lang="en-US" smtClean="0"/>
+              <a:t>opbouw</a:t>
+            </a:r>
+            <a:r>
+              <a:rPr lang="en-US" smtClean="0"/>
+              <a:t>: Weerstand tot verhuizen</a:t>
             </a:r>
             <a:endParaRPr lang="en-US" dirty="0"/>
           </a:p>
@@ -15780,8 +15790,8 @@
         </p:nvSpPr>
         <p:spPr>
           <a:xfrm>
-            <a:off x="1524000" y="2209291"/>
-            <a:ext cx="4267200" cy="646331"/>
+            <a:off x="2695833" y="2047795"/>
+            <a:ext cx="4267200" cy="923330"/>
           </a:xfrm>
           <a:prstGeom prst="rect">
             <a:avLst/>
@@ -15795,8 +15805,8 @@
           <a:lstStyle/>
           <a:p>
             <a:r>
-              <a:rPr lang="en-US" dirty="0" smtClean="0"/>
-              <a:t>Gradually declining slope due to change in age of household members.</a:t>
+              <a:rPr lang="en-US" smtClean="0"/>
+              <a:t>Geleidelijk dalende helling als gevolg van veranderingen in de leeftijd van de leden van het huishouden</a:t>
             </a:r>
             <a:endParaRPr lang="en-US" dirty="0"/>
           </a:p>
@@ -15825,8 +15835,8 @@
           <a:lstStyle/>
           <a:p>
             <a:r>
-              <a:rPr lang="en-US" dirty="0" smtClean="0"/>
-              <a:t>Childbirth</a:t>
+              <a:rPr lang="en-US" smtClean="0"/>
+              <a:t>Geboorte</a:t>
             </a:r>
             <a:endParaRPr lang="en-US" dirty="0"/>
           </a:p>
@@ -15855,8 +15865,12 @@
           <a:lstStyle/>
           <a:p>
             <a:r>
-              <a:rPr lang="en-US" dirty="0" smtClean="0"/>
-              <a:t>Plateau reached</a:t>
+              <a:rPr lang="en-US" smtClean="0"/>
+              <a:t>Plateau </a:t>
+            </a:r>
+            <a:r>
+              <a:rPr lang="en-US" smtClean="0"/>
+              <a:t>bereikt</a:t>
             </a:r>
             <a:endParaRPr lang="en-US" dirty="0"/>
           </a:p>
@@ -15936,8 +15950,8 @@
         </p:nvSpPr>
         <p:spPr>
           <a:xfrm>
-            <a:off x="5105400" y="6138446"/>
-            <a:ext cx="2019300" cy="338554"/>
+            <a:off x="4953000" y="6138446"/>
+            <a:ext cx="2514600" cy="338554"/>
           </a:xfrm>
           <a:prstGeom prst="rect">
             <a:avLst/>
@@ -15951,8 +15965,8 @@
           <a:lstStyle/>
           <a:p>
             <a:r>
-              <a:rPr lang="en-US" sz="1600" dirty="0" smtClean="0"/>
-              <a:t> Time since moving</a:t>
+              <a:rPr lang="en-US" sz="1600" smtClean="0"/>
+              <a:t>Tijd sinds verhuizing</a:t>
             </a:r>
             <a:endParaRPr lang="en-US" sz="1600" dirty="0"/>
           </a:p>
@@ -15966,8 +15980,8 @@
         </p:nvSpPr>
         <p:spPr>
           <a:xfrm rot="16200000">
-            <a:off x="-645527" y="2686345"/>
-            <a:ext cx="2019300" cy="338554"/>
+            <a:off x="-997012" y="2792060"/>
+            <a:ext cx="2722272" cy="338554"/>
           </a:xfrm>
           <a:prstGeom prst="rect">
             <a:avLst/>
@@ -15981,8 +15995,8 @@
           <a:lstStyle/>
           <a:p>
             <a:r>
-              <a:rPr lang="en-US" sz="1600" dirty="0" smtClean="0"/>
-              <a:t>Resistance to move</a:t>
+              <a:rPr lang="en-US" sz="1600" smtClean="0"/>
+              <a:t>Weerstand tot verhuizen</a:t>
             </a:r>
             <a:endParaRPr lang="en-US" sz="1600" dirty="0"/>
           </a:p>
@@ -15996,7 +16010,7 @@
         </p:nvCxnSpPr>
         <p:spPr>
           <a:xfrm>
-            <a:off x="4572000" y="6324600"/>
+            <a:off x="4343400" y="6324600"/>
             <a:ext cx="609600" cy="0"/>
           </a:xfrm>
           <a:prstGeom prst="straightConnector1">
@@ -16034,8 +16048,8 @@
         </p:nvCxnSpPr>
         <p:spPr>
           <a:xfrm flipV="1">
-            <a:off x="364122" y="3865272"/>
-            <a:ext cx="1" cy="554328"/>
+            <a:off x="364122" y="4322473"/>
+            <a:ext cx="2" cy="554331"/>
           </a:xfrm>
           <a:prstGeom prst="straightConnector1">
             <a:avLst/>
@@ -16121,14 +16135,25 @@
             <p:ph type="title"/>
           </p:nvPr>
         </p:nvSpPr>
-        <p:spPr/>
+        <p:spPr>
+          <a:xfrm>
+            <a:off x="457200" y="274638"/>
+            <a:ext cx="8305800" cy="1143000"/>
+          </a:xfrm>
+        </p:spPr>
         <p:txBody>
-          <a:bodyPr/>
+          <a:bodyPr>
+            <a:normAutofit/>
+          </a:bodyPr>
           <a:lstStyle/>
           <a:p>
             <a:r>
-              <a:rPr lang="en-US" dirty="0" smtClean="0"/>
-              <a:t>Model Logic: Job Attractiveness</a:t>
+              <a:rPr lang="en-US" smtClean="0"/>
+              <a:t>Model </a:t>
+            </a:r>
+            <a:r>
+              <a:rPr lang="en-US" smtClean="0"/>
+              <a:t>opbouw: Aantrekkelijkheid werk</a:t>
             </a:r>
             <a:endParaRPr lang="en-US" dirty="0"/>
           </a:p>
@@ -16143,7 +16168,7 @@
           <p:nvPr>
             <p:extLst>
               <p:ext uri="{D42A27DB-BD31-4B8C-83A1-F6EECF244321}">
-                <p14:modId xmlns:p14="http://schemas.microsoft.com/office/powerpoint/2010/main" val="3071741282"/>
+                <p14:modId xmlns:p14="http://schemas.microsoft.com/office/powerpoint/2010/main" val="1788017248"/>
               </p:ext>
             </p:extLst>
           </p:nvPr>
@@ -16225,8 +16250,8 @@
         </p:nvSpPr>
         <p:spPr>
           <a:xfrm>
-            <a:off x="6629400" y="5029200"/>
-            <a:ext cx="2133600" cy="338554"/>
+            <a:off x="6477000" y="5071646"/>
+            <a:ext cx="2286000" cy="338554"/>
           </a:xfrm>
           <a:prstGeom prst="rect">
             <a:avLst/>
@@ -16240,8 +16265,12 @@
           <a:lstStyle/>
           <a:p>
             <a:r>
-              <a:rPr lang="en-US" sz="1600" dirty="0" smtClean="0"/>
-              <a:t>City occupancy rate</a:t>
+              <a:rPr lang="en-US" sz="1600" smtClean="0"/>
+              <a:t>B</a:t>
+            </a:r>
+            <a:r>
+              <a:rPr lang="en-US" sz="1600" smtClean="0"/>
+              <a:t>ezettingsgraad stad</a:t>
             </a:r>
             <a:endParaRPr lang="en-US" sz="1600" dirty="0"/>
           </a:p>
@@ -16255,7 +16284,7 @@
         </p:nvCxnSpPr>
         <p:spPr>
           <a:xfrm>
-            <a:off x="6019800" y="5215354"/>
+            <a:off x="5943600" y="5257800"/>
             <a:ext cx="609600" cy="0"/>
           </a:xfrm>
           <a:prstGeom prst="straightConnector1">
@@ -16291,8 +16320,8 @@
         </p:nvSpPr>
         <p:spPr>
           <a:xfrm rot="16200000">
-            <a:off x="3188885" y="2449916"/>
-            <a:ext cx="1580784" cy="338554"/>
+            <a:off x="2998386" y="2564215"/>
+            <a:ext cx="1961786" cy="338554"/>
           </a:xfrm>
           <a:prstGeom prst="rect">
             <a:avLst/>
@@ -16306,8 +16335,8 @@
           <a:lstStyle/>
           <a:p>
             <a:r>
-              <a:rPr lang="en-US" sz="1600" dirty="0" smtClean="0"/>
-              <a:t>Attractiveness</a:t>
+              <a:rPr lang="en-US" sz="1600" smtClean="0"/>
+              <a:t>Aantrekkelijkheid</a:t>
             </a:r>
             <a:endParaRPr lang="en-US" sz="1600" dirty="0"/>
           </a:p>
@@ -16321,7 +16350,7 @@
         </p:nvCxnSpPr>
         <p:spPr>
           <a:xfrm rot="16200000">
-            <a:off x="3688720" y="3714385"/>
+            <a:off x="3688720" y="4019184"/>
             <a:ext cx="609600" cy="0"/>
           </a:xfrm>
           <a:prstGeom prst="straightConnector1">
@@ -16408,14 +16437,29 @@
             <p:ph type="title"/>
           </p:nvPr>
         </p:nvSpPr>
-        <p:spPr/>
+        <p:spPr>
+          <a:xfrm>
+            <a:off x="457199" y="274638"/>
+            <a:ext cx="8079259" cy="1143000"/>
+          </a:xfrm>
+        </p:spPr>
         <p:txBody>
-          <a:bodyPr/>
+          <a:bodyPr>
+            <a:normAutofit/>
+          </a:bodyPr>
           <a:lstStyle/>
           <a:p>
             <a:r>
-              <a:rPr lang="en-US" dirty="0" smtClean="0"/>
-              <a:t>Model Logic: Job Attractiveness</a:t>
+              <a:rPr lang="en-US" smtClean="0"/>
+              <a:t>Model </a:t>
+            </a:r>
+            <a:r>
+              <a:rPr lang="en-US" smtClean="0"/>
+              <a:t>opbouw</a:t>
+            </a:r>
+            <a:r>
+              <a:rPr lang="en-US" smtClean="0"/>
+              <a:t>: Aantrekkelijkheid werk</a:t>
             </a:r>
             <a:endParaRPr lang="en-US" dirty="0"/>
           </a:p>
@@ -16430,7 +16474,7 @@
           <p:nvPr>
             <p:extLst>
               <p:ext uri="{D42A27DB-BD31-4B8C-83A1-F6EECF244321}">
-                <p14:modId xmlns:p14="http://schemas.microsoft.com/office/powerpoint/2010/main" val="2609375942"/>
+                <p14:modId xmlns:p14="http://schemas.microsoft.com/office/powerpoint/2010/main" val="2336704673"/>
               </p:ext>
             </p:extLst>
           </p:nvPr>
@@ -16512,8 +16556,8 @@
         </p:nvSpPr>
         <p:spPr>
           <a:xfrm>
-            <a:off x="5867400" y="4977825"/>
-            <a:ext cx="2895600" cy="584775"/>
+            <a:off x="6780772" y="4977825"/>
+            <a:ext cx="2134628" cy="584775"/>
           </a:xfrm>
           <a:prstGeom prst="rect">
             <a:avLst/>
@@ -16527,24 +16571,8 @@
           <a:lstStyle/>
           <a:p>
             <a:r>
-              <a:rPr lang="en-US" sz="1600" dirty="0" smtClean="0"/>
-              <a:t>Fraction people in 2</a:t>
-            </a:r>
-            <a:r>
-              <a:rPr lang="en-US" sz="1600" baseline="30000" dirty="0" smtClean="0"/>
-              <a:t>nd</a:t>
-            </a:r>
-            <a:r>
-              <a:rPr lang="en-US" sz="1600" dirty="0" smtClean="0"/>
-              <a:t> or 4</a:t>
-            </a:r>
-            <a:r>
-              <a:rPr lang="en-US" sz="1600" baseline="30000" dirty="0" smtClean="0"/>
-              <a:t>th</a:t>
-            </a:r>
-            <a:r>
-              <a:rPr lang="en-US" sz="1600" dirty="0" smtClean="0"/>
-              <a:t> sector jobs</a:t>
+              <a:rPr lang="en-US" sz="1600" smtClean="0"/>
+              <a:t>Fractie mensen in 2e of 4e sector</a:t>
             </a:r>
             <a:endParaRPr lang="en-US" sz="1600" dirty="0"/>
           </a:p>
@@ -16558,7 +16586,7 @@
         </p:nvCxnSpPr>
         <p:spPr>
           <a:xfrm>
-            <a:off x="5257800" y="5181600"/>
+            <a:off x="6172200" y="5185719"/>
             <a:ext cx="609600" cy="0"/>
           </a:xfrm>
           <a:prstGeom prst="straightConnector1">
@@ -16594,8 +16622,8 @@
         </p:nvSpPr>
         <p:spPr>
           <a:xfrm rot="16200000">
-            <a:off x="3188885" y="2449916"/>
-            <a:ext cx="1580784" cy="338554"/>
+            <a:off x="2960287" y="2545530"/>
+            <a:ext cx="2037986" cy="338554"/>
           </a:xfrm>
           <a:prstGeom prst="rect">
             <a:avLst/>
@@ -16609,8 +16637,8 @@
           <a:lstStyle/>
           <a:p>
             <a:r>
-              <a:rPr lang="en-US" sz="1600" dirty="0" smtClean="0"/>
-              <a:t>Attractiveness</a:t>
+              <a:rPr lang="en-US" sz="1600" smtClean="0"/>
+              <a:t>Aantrekkelijkheid</a:t>
             </a:r>
             <a:endParaRPr lang="en-US" sz="1600" dirty="0"/>
           </a:p>
@@ -16624,7 +16652,7 @@
         </p:nvCxnSpPr>
         <p:spPr>
           <a:xfrm rot="16200000">
-            <a:off x="3688720" y="3714385"/>
+            <a:off x="3688720" y="4038600"/>
             <a:ext cx="609600" cy="0"/>
           </a:xfrm>
           <a:prstGeom prst="straightConnector1">
@@ -16711,14 +16739,27 @@
             <p:ph type="title"/>
           </p:nvPr>
         </p:nvSpPr>
-        <p:spPr/>
+        <p:spPr>
+          <a:xfrm>
+            <a:off x="457200" y="274638"/>
+            <a:ext cx="8229600" cy="1143000"/>
+          </a:xfrm>
+        </p:spPr>
         <p:txBody>
           <a:bodyPr/>
           <a:lstStyle/>
           <a:p>
             <a:r>
-              <a:rPr lang="en-US" dirty="0" smtClean="0"/>
-              <a:t>Model Logic: Job Attractiveness</a:t>
+              <a:rPr lang="en-US" smtClean="0"/>
+              <a:t>Model </a:t>
+            </a:r>
+            <a:r>
+              <a:rPr lang="en-US" smtClean="0"/>
+              <a:t>opbouw</a:t>
+            </a:r>
+            <a:r>
+              <a:rPr lang="en-US" smtClean="0"/>
+              <a:t>: Aantrekkelijkheid werk</a:t>
             </a:r>
             <a:endParaRPr lang="en-US" dirty="0"/>
           </a:p>
@@ -16733,7 +16774,7 @@
           <p:nvPr>
             <p:extLst>
               <p:ext uri="{D42A27DB-BD31-4B8C-83A1-F6EECF244321}">
-                <p14:modId xmlns:p14="http://schemas.microsoft.com/office/powerpoint/2010/main" val="830140813"/>
+                <p14:modId xmlns:p14="http://schemas.microsoft.com/office/powerpoint/2010/main" val="3163245945"/>
               </p:ext>
             </p:extLst>
           </p:nvPr>
@@ -16815,8 +16856,8 @@
         </p:nvSpPr>
         <p:spPr>
           <a:xfrm>
-            <a:off x="5257800" y="2362200"/>
-            <a:ext cx="1447800" cy="646331"/>
+            <a:off x="5334000" y="2401669"/>
+            <a:ext cx="1752600" cy="646331"/>
           </a:xfrm>
           <a:prstGeom prst="rect">
             <a:avLst/>
@@ -16830,14 +16871,8 @@
           <a:lstStyle/>
           <a:p>
             <a:r>
-              <a:rPr lang="en-US" dirty="0" smtClean="0"/>
-              <a:t>Service-like</a:t>
-            </a:r>
-          </a:p>
-          <a:p>
-            <a:r>
-              <a:rPr lang="en-US" dirty="0" smtClean="0"/>
-              <a:t>effect</a:t>
+              <a:rPr lang="nl-NL" smtClean="0"/>
+              <a:t>‘Service-like’ effect</a:t>
             </a:r>
             <a:endParaRPr lang="en-US" dirty="0"/>
           </a:p>
@@ -16851,7 +16886,7 @@
         </p:nvSpPr>
         <p:spPr>
           <a:xfrm>
-            <a:off x="6629400" y="4114800"/>
+            <a:off x="6705600" y="4114800"/>
             <a:ext cx="2133600" cy="646331"/>
           </a:xfrm>
           <a:prstGeom prst="rect">
@@ -16866,8 +16901,12 @@
           <a:lstStyle/>
           <a:p>
             <a:r>
+              <a:rPr lang="en-US" smtClean="0"/>
+              <a:t>Specialisatie </a:t>
+            </a:r>
+            <a:r>
               <a:rPr lang="en-US" dirty="0" smtClean="0"/>
-              <a:t>Specialization effect</a:t>
+              <a:t>effect</a:t>
             </a:r>
             <a:endParaRPr lang="en-US" dirty="0"/>
           </a:p>
@@ -16947,7 +16986,7 @@
         </p:nvSpPr>
         <p:spPr>
           <a:xfrm>
-            <a:off x="5458366" y="4995446"/>
+            <a:off x="5915566" y="4995446"/>
             <a:ext cx="3380834" cy="338554"/>
           </a:xfrm>
           <a:prstGeom prst="rect">
@@ -16962,16 +17001,8 @@
           <a:lstStyle/>
           <a:p>
             <a:r>
-              <a:rPr lang="en-US" sz="1600" dirty="0" smtClean="0"/>
-              <a:t>Fraction people in 3</a:t>
-            </a:r>
-            <a:r>
-              <a:rPr lang="en-US" sz="1600" baseline="30000" dirty="0" smtClean="0"/>
-              <a:t>rd</a:t>
-            </a:r>
-            <a:r>
-              <a:rPr lang="en-US" sz="1600" dirty="0" smtClean="0"/>
-              <a:t> sector jobs</a:t>
+              <a:rPr lang="en-US" sz="1600" smtClean="0"/>
+              <a:t>Fractie mensen in 3e sector</a:t>
             </a:r>
             <a:endParaRPr lang="en-US" sz="1600" dirty="0"/>
           </a:p>
@@ -16985,7 +17016,7 @@
         </p:nvCxnSpPr>
         <p:spPr>
           <a:xfrm>
-            <a:off x="4848767" y="5181600"/>
+            <a:off x="5257800" y="5181600"/>
             <a:ext cx="609600" cy="0"/>
           </a:xfrm>
           <a:prstGeom prst="straightConnector1">
@@ -17021,8 +17052,8 @@
         </p:nvSpPr>
         <p:spPr>
           <a:xfrm rot="16200000">
-            <a:off x="3188885" y="2449916"/>
-            <a:ext cx="1580784" cy="338554"/>
+            <a:off x="2950579" y="2459624"/>
+            <a:ext cx="2057400" cy="338554"/>
           </a:xfrm>
           <a:prstGeom prst="rect">
             <a:avLst/>
@@ -17036,8 +17067,8 @@
           <a:lstStyle/>
           <a:p>
             <a:r>
-              <a:rPr lang="en-US" sz="1600" dirty="0" smtClean="0"/>
-              <a:t>Attractiveness</a:t>
+              <a:rPr lang="en-US" sz="1600" smtClean="0"/>
+              <a:t>Aantrekkelijkheid</a:t>
             </a:r>
             <a:endParaRPr lang="en-US" sz="1600" dirty="0"/>
           </a:p>
@@ -17051,7 +17082,7 @@
         </p:nvCxnSpPr>
         <p:spPr>
           <a:xfrm rot="16200000">
-            <a:off x="3688720" y="3714385"/>
+            <a:off x="3688720" y="3962400"/>
             <a:ext cx="609600" cy="0"/>
           </a:xfrm>
           <a:prstGeom prst="straightConnector1">
@@ -17169,8 +17200,8 @@
           <a:lstStyle/>
           <a:p>
             <a:r>
-              <a:rPr lang="en-US" dirty="0" smtClean="0"/>
-              <a:t>Map with randomly </a:t>
+              <a:rPr lang="en-US" smtClean="0"/>
+              <a:t>Kaart met random </a:t>
             </a:r>
           </a:p>
           <a:p>
@@ -17178,62 +17209,65 @@
               <a:buNone/>
             </a:pPr>
             <a:r>
-              <a:rPr lang="en-US" dirty="0" smtClean="0"/>
-              <a:t>distributed cities</a:t>
-            </a:r>
-          </a:p>
-          <a:p>
-            <a:r>
-              <a:rPr lang="en-US" dirty="0" smtClean="0"/>
-              <a:t>Households distributed</a:t>
-            </a:r>
-          </a:p>
-          <a:p>
-            <a:pPr marL="0" indent="0">
-              <a:buNone/>
-            </a:pPr>
-            <a:r>
-              <a:rPr lang="en-US" dirty="0" smtClean="0"/>
-              <a:t>over cities &amp; countryside</a:t>
-            </a:r>
-          </a:p>
-          <a:p>
-            <a:pPr marL="0" indent="0">
-              <a:buNone/>
-            </a:pPr>
-            <a:endParaRPr lang="en-US" dirty="0"/>
-          </a:p>
-          <a:p>
+              <a:rPr lang="en-US" smtClean="0"/>
+              <a:t>   verdeelde steden </a:t>
+            </a:r>
             <a:endParaRPr lang="en-US" dirty="0" smtClean="0"/>
           </a:p>
           <a:p>
+            <a:r>
+              <a:rPr lang="en-US" smtClean="0"/>
+              <a:t>Huishoudens verdeeld</a:t>
+            </a:r>
+          </a:p>
+          <a:p>
+            <a:r>
+              <a:rPr lang="en-US" smtClean="0"/>
+              <a:t>Over steden &amp; platteland</a:t>
+            </a:r>
             <a:endParaRPr lang="en-US" dirty="0" smtClean="0"/>
           </a:p>
           <a:p>
-            <a:r>
-              <a:rPr lang="en-US" dirty="0" smtClean="0"/>
-              <a:t>For every tick (1 year)</a:t>
-            </a:r>
+            <a:endParaRPr lang="nl-NL" smtClean="0"/>
+          </a:p>
+          <a:p>
+            <a:endParaRPr lang="nl-NL"/>
+          </a:p>
+          <a:p>
+            <a:endParaRPr lang="en-US" dirty="0" smtClean="0"/>
+          </a:p>
+          <a:p>
+            <a:r>
+              <a:rPr lang="en-US" smtClean="0"/>
+              <a:t>Voor elke model ‘tick’ </a:t>
+            </a:r>
+            <a:r>
+              <a:rPr lang="en-US" smtClean="0"/>
+              <a:t>(= 1 jaar)</a:t>
+            </a:r>
+            <a:endParaRPr lang="en-US" dirty="0" smtClean="0"/>
           </a:p>
           <a:p>
             <a:pPr lvl="1"/>
             <a:r>
-              <a:rPr lang="en-US" dirty="0" smtClean="0"/>
-              <a:t>Total number of households</a:t>
-            </a:r>
+              <a:rPr lang="en-US" smtClean="0"/>
+              <a:t>Totaal aantal huishoudens</a:t>
+            </a:r>
+            <a:endParaRPr lang="en-US" dirty="0" smtClean="0"/>
           </a:p>
           <a:p>
             <a:pPr lvl="1"/>
             <a:r>
-              <a:rPr lang="en-US" dirty="0" smtClean="0"/>
-              <a:t>Number of households in and out of cities</a:t>
-            </a:r>
+              <a:rPr lang="en-US" smtClean="0"/>
+              <a:t>Aantal huishoudens binnen en buiten steden</a:t>
+            </a:r>
+            <a:endParaRPr lang="en-US" dirty="0" smtClean="0"/>
           </a:p>
           <a:p>
             <a:pPr lvl="1"/>
             <a:r>
-              <a:rPr lang="en-US" dirty="0" smtClean="0"/>
-              <a:t>Number of households for the 10 different cities</a:t>
+              <a:rPr lang="en-US" smtClean="0"/>
+              <a:t>Aantal huishoudens per stad</a:t>
             </a:r>
             <a:endParaRPr lang="en-US" dirty="0"/>
           </a:p>
@@ -17262,7 +17296,7 @@
         </p:blipFill>
         <p:spPr bwMode="auto">
           <a:xfrm>
-            <a:off x="4419600" y="766761"/>
+            <a:off x="4621593" y="457200"/>
             <a:ext cx="3989007" cy="4110039"/>
           </a:xfrm>
           <a:prstGeom prst="rect">
@@ -17467,8 +17501,16 @@
           <a:lstStyle/>
           <a:p>
             <a:r>
-              <a:rPr lang="en-US" dirty="0" smtClean="0"/>
-              <a:t>Verification &amp; Validation</a:t>
+              <a:rPr lang="en-US" smtClean="0"/>
+              <a:t>Verificatie </a:t>
+            </a:r>
+            <a:r>
+              <a:rPr lang="en-US" smtClean="0"/>
+              <a:t>&amp; </a:t>
+            </a:r>
+            <a:r>
+              <a:rPr lang="en-US" smtClean="0"/>
+              <a:t>Validatie</a:t>
             </a:r>
             <a:endParaRPr lang="en-US" dirty="0"/>
           </a:p>
@@ -17487,28 +17529,39 @@
         <p:spPr/>
         <p:txBody>
           <a:bodyPr>
-            <a:normAutofit/>
+            <a:normAutofit lnSpcReduction="10000"/>
           </a:bodyPr>
           <a:lstStyle/>
           <a:p>
             <a:r>
-              <a:rPr lang="en-US" dirty="0" smtClean="0"/>
-              <a:t>Verification </a:t>
-            </a:r>
+              <a:rPr lang="en-US" smtClean="0"/>
+              <a:t>Verificatie </a:t>
+            </a:r>
+            <a:endParaRPr lang="en-US" dirty="0" smtClean="0"/>
           </a:p>
           <a:p>
             <a:pPr lvl="1"/>
             <a:r>
-              <a:rPr lang="en-US" dirty="0" smtClean="0"/>
-              <a:t>6 Tests on a single-agent, minimal interaction and multi-agent level</a:t>
-            </a:r>
+              <a:rPr lang="en-US" smtClean="0"/>
+              <a:t>6 </a:t>
+            </a:r>
+            <a:r>
+              <a:rPr lang="en-US" smtClean="0"/>
+              <a:t>testen voor een ‘</a:t>
+            </a:r>
+            <a:r>
+              <a:rPr lang="en-US" smtClean="0"/>
+              <a:t>single-agent’, ‘minimal interaction’ en ‘multi-agent’ niveau</a:t>
+            </a:r>
+            <a:endParaRPr lang="en-US" dirty="0" smtClean="0"/>
           </a:p>
           <a:p>
             <a:pPr lvl="1"/>
             <a:r>
-              <a:rPr lang="en-US" dirty="0" smtClean="0"/>
-              <a:t>The model is implemented as intended</a:t>
-            </a:r>
+              <a:rPr lang="en-US" smtClean="0"/>
+              <a:t>Het model is opgezet zoals beoogd</a:t>
+            </a:r>
+            <a:endParaRPr lang="en-US" dirty="0" smtClean="0"/>
           </a:p>
           <a:p>
             <a:pPr lvl="1"/>
@@ -17516,15 +17569,20 @@
           </a:p>
           <a:p>
             <a:r>
-              <a:rPr lang="en-US" dirty="0" smtClean="0"/>
-              <a:t>Literature validation</a:t>
-            </a:r>
+              <a:rPr lang="en-US" smtClean="0"/>
+              <a:t>Literatuur validatie</a:t>
+            </a:r>
+            <a:endParaRPr lang="en-US" dirty="0" smtClean="0"/>
           </a:p>
           <a:p>
             <a:pPr lvl="1"/>
             <a:r>
-              <a:rPr lang="en-US" dirty="0" smtClean="0"/>
-              <a:t>Parameters and relations are based on literature</a:t>
+              <a:rPr lang="en-US" smtClean="0"/>
+              <a:t>Parameters </a:t>
+            </a:r>
+            <a:r>
+              <a:rPr lang="en-US" smtClean="0"/>
+              <a:t>en relaties in model gebaseerd op literatuur</a:t>
             </a:r>
           </a:p>
           <a:p>
@@ -17533,29 +17591,32 @@
           </a:p>
           <a:p>
             <a:r>
-              <a:rPr lang="en-US" dirty="0" smtClean="0"/>
-              <a:t>Face validation through expert consultation</a:t>
-            </a:r>
+              <a:rPr lang="en-US" smtClean="0"/>
+              <a:t>Indruksvaliditie samen met CPB</a:t>
+            </a:r>
+            <a:endParaRPr lang="en-US" dirty="0" smtClean="0"/>
           </a:p>
           <a:p>
             <a:pPr lvl="1"/>
             <a:r>
-              <a:rPr lang="en-US" dirty="0" smtClean="0"/>
-              <a:t>Assumptions</a:t>
-            </a:r>
+              <a:rPr lang="en-US" smtClean="0"/>
+              <a:t>Assumpties</a:t>
+            </a:r>
+            <a:endParaRPr lang="en-US" dirty="0" smtClean="0"/>
           </a:p>
           <a:p>
             <a:pPr lvl="1"/>
             <a:r>
-              <a:rPr lang="en-US" dirty="0" smtClean="0"/>
-              <a:t>Relations </a:t>
-            </a:r>
+              <a:rPr lang="en-US" smtClean="0"/>
+              <a:t>Relaties</a:t>
+            </a:r>
+            <a:endParaRPr lang="en-US" dirty="0" smtClean="0"/>
           </a:p>
           <a:p>
             <a:pPr lvl="1"/>
             <a:r>
-              <a:rPr lang="en-US" dirty="0" smtClean="0"/>
-              <a:t>Concepts</a:t>
+              <a:rPr lang="en-US" smtClean="0"/>
+              <a:t>Concepten</a:t>
             </a:r>
             <a:endParaRPr lang="en-US" dirty="0"/>
           </a:p>
@@ -17626,8 +17687,8 @@
           <a:lstStyle/>
           <a:p>
             <a:r>
-              <a:rPr lang="en-US" dirty="0" smtClean="0"/>
-              <a:t>Experimental Design</a:t>
+              <a:rPr lang="en-US" smtClean="0"/>
+              <a:t>Experimenteel Ontwerp</a:t>
             </a:r>
             <a:endParaRPr lang="en-US" dirty="0"/>
           </a:p>
@@ -17654,38 +17715,32 @@
           <a:lstStyle/>
           <a:p>
             <a:r>
-              <a:rPr lang="en-US" dirty="0"/>
-              <a:t>W</a:t>
-            </a:r>
-            <a:r>
-              <a:rPr lang="en-US" dirty="0" smtClean="0"/>
-              <a:t>hich </a:t>
-            </a:r>
-            <a:r>
-              <a:rPr lang="en-US" dirty="0"/>
-              <a:t>variables have the most influence on creating the desired model output</a:t>
-            </a:r>
-            <a:r>
-              <a:rPr lang="en-US" dirty="0" smtClean="0"/>
-              <a:t>?</a:t>
-            </a:r>
+              <a:rPr lang="en-US" smtClean="0"/>
+              <a:t>Welke variabelen hebben de meeste invloed op het verkrijgen van de gewenste model output?</a:t>
+            </a:r>
+            <a:endParaRPr lang="en-US" dirty="0" smtClean="0"/>
           </a:p>
           <a:p>
             <a:endParaRPr lang="en-US" dirty="0"/>
           </a:p>
           <a:p>
             <a:r>
-              <a:rPr lang="en-US" dirty="0" smtClean="0"/>
+              <a:rPr lang="en-US" smtClean="0"/>
               <a:t>Multi-</a:t>
             </a:r>
             <a:r>
-              <a:rPr lang="en-US" dirty="0" err="1" smtClean="0"/>
+              <a:rPr lang="en-US" err="1" smtClean="0"/>
               <a:t>variate</a:t>
             </a:r>
             <a:r>
-              <a:rPr lang="en-US" dirty="0" smtClean="0"/>
-              <a:t> analysis</a:t>
-            </a:r>
+              <a:rPr lang="en-US" smtClean="0"/>
+              <a:t> </a:t>
+            </a:r>
+            <a:r>
+              <a:rPr lang="en-US" smtClean="0"/>
+              <a:t>analyse</a:t>
+            </a:r>
+            <a:endParaRPr lang="en-US" dirty="0" smtClean="0"/>
           </a:p>
           <a:p>
             <a:r>
@@ -17695,34 +17750,33 @@
           </a:p>
           <a:p>
             <a:r>
-              <a:rPr lang="en-US" dirty="0" smtClean="0"/>
-              <a:t>Because of long run time, limited number of runs (300)</a:t>
-            </a:r>
-          </a:p>
-          <a:p>
+              <a:rPr lang="en-US" smtClean="0"/>
+              <a:t>Gelimiteerd aantal runs door lange runtime</a:t>
+            </a:r>
             <a:endParaRPr lang="en-US" dirty="0" smtClean="0"/>
           </a:p>
           <a:p>
-            <a:r>
-              <a:rPr lang="en-US" dirty="0" smtClean="0"/>
-              <a:t>Compare R-squared to a pure </a:t>
-            </a:r>
-            <a:r>
-              <a:rPr lang="en-US" dirty="0" err="1" smtClean="0"/>
-              <a:t>Zipfian</a:t>
-            </a:r>
-            <a:r>
-              <a:rPr lang="en-US" dirty="0" smtClean="0"/>
-              <a:t> distribution</a:t>
-            </a:r>
-          </a:p>
-          <a:p>
-            <a:r>
-              <a:rPr lang="en-US" dirty="0" smtClean="0"/>
-              <a:t>R-squared &gt; 0,80 found in literature</a:t>
-            </a:r>
-          </a:p>
-          <a:p>
+            <a:endParaRPr lang="en-US" dirty="0" smtClean="0"/>
+          </a:p>
+          <a:p>
+            <a:r>
+              <a:rPr lang="en-US" smtClean="0"/>
+              <a:t>Vergelijk R-squared met een pefecte Zipfian distributie</a:t>
+            </a:r>
+          </a:p>
+          <a:p>
+            <a:r>
+              <a:rPr lang="en-US" smtClean="0"/>
+              <a:t>R-squared </a:t>
+            </a:r>
+            <a:r>
+              <a:rPr lang="en-US" smtClean="0"/>
+              <a:t>&gt; </a:t>
+            </a:r>
+            <a:r>
+              <a:rPr lang="en-US" smtClean="0"/>
+              <a:t>0,80 gevonden in literatuur</a:t>
+            </a:r>
             <a:endParaRPr lang="en-US" dirty="0"/>
           </a:p>
         </p:txBody>
@@ -17821,8 +17875,8 @@
           <a:lstStyle/>
           <a:p>
             <a:r>
-              <a:rPr lang="en-US" dirty="0" smtClean="0"/>
-              <a:t>Model Experimentation</a:t>
+              <a:rPr lang="en-US" smtClean="0"/>
+              <a:t>Experimenteren</a:t>
             </a:r>
             <a:endParaRPr lang="en-US" dirty="0"/>
           </a:p>
@@ -17893,8 +17947,8 @@
           <a:lstStyle/>
           <a:p>
             <a:r>
-              <a:rPr lang="en-US" dirty="0" smtClean="0"/>
-              <a:t>Model Experimentation</a:t>
+              <a:rPr lang="en-US" smtClean="0"/>
+              <a:t>Resultaten</a:t>
             </a:r>
             <a:endParaRPr lang="en-US" dirty="0"/>
           </a:p>
@@ -17916,8 +17970,16 @@
           <a:lstStyle/>
           <a:p>
             <a:r>
+              <a:rPr lang="en-US" smtClean="0"/>
+              <a:t>1/3 </a:t>
+            </a:r>
+            <a:r>
+              <a:rPr lang="en-US" smtClean="0"/>
+              <a:t>van de runs hebben een R-squared </a:t>
+            </a:r>
+            <a:r>
               <a:rPr lang="en-US" dirty="0" smtClean="0"/>
-              <a:t>1/3 of the runs R-squared &gt; 0,8</a:t>
+              <a:t>&gt; 0,8</a:t>
             </a:r>
           </a:p>
           <a:p>
@@ -17925,8 +17987,8 @@
           </a:p>
           <a:p>
             <a:r>
-              <a:rPr lang="en-US" dirty="0" smtClean="0"/>
-              <a:t>Verified by running the model again, with the outputs of the decision tree as an input space</a:t>
+              <a:rPr lang="en-US" smtClean="0"/>
+              <a:t>Geverifieerd door het model opnieuw te runnen, met de resultaten van de beslisboom als input</a:t>
             </a:r>
           </a:p>
           <a:p>
@@ -17934,16 +17996,8 @@
           </a:p>
           <a:p>
             <a:r>
-              <a:rPr lang="en-US" dirty="0" smtClean="0"/>
-              <a:t>These runs showed quite a lot of runs concurrent with the </a:t>
-            </a:r>
-            <a:r>
-              <a:rPr lang="en-US" dirty="0" err="1" smtClean="0"/>
-              <a:t>Zipf’s</a:t>
-            </a:r>
-            <a:r>
-              <a:rPr lang="en-US" dirty="0" smtClean="0"/>
-              <a:t> law compared to the base runs</a:t>
+              <a:rPr lang="en-US" smtClean="0"/>
+              <a:t>Veel van deze model runs tonen gedrag overeenkomend met de Zipf’s law vergeleken met de base runs</a:t>
             </a:r>
             <a:endParaRPr lang="en-US" dirty="0"/>
           </a:p>
@@ -18014,8 +18068,8 @@
           <a:lstStyle/>
           <a:p>
             <a:r>
-              <a:rPr lang="en-US" dirty="0" smtClean="0"/>
-              <a:t>Contents</a:t>
+              <a:rPr lang="en-US" smtClean="0"/>
+              <a:t>inhoudsopgave</a:t>
             </a:r>
             <a:endParaRPr lang="en-US" dirty="0"/>
           </a:p>
@@ -18039,70 +18093,78 @@
           <a:lstStyle/>
           <a:p>
             <a:r>
-              <a:rPr lang="en-US" dirty="0" smtClean="0"/>
-              <a:t>CPB and </a:t>
-            </a:r>
-            <a:r>
-              <a:rPr lang="en-US" dirty="0" err="1" smtClean="0"/>
-              <a:t>Zipf’s</a:t>
-            </a:r>
-            <a:r>
-              <a:rPr lang="en-US" dirty="0" smtClean="0"/>
-              <a:t> law</a:t>
-            </a:r>
-          </a:p>
-          <a:p>
-            <a:r>
-              <a:rPr lang="en-US" dirty="0" smtClean="0"/>
-              <a:t>Research question &amp; Approach</a:t>
-            </a:r>
-          </a:p>
-          <a:p>
-            <a:r>
-              <a:rPr lang="en-US" dirty="0" smtClean="0"/>
+              <a:rPr lang="en-US" smtClean="0"/>
+              <a:t>Zipf’s </a:t>
+            </a:r>
+            <a:r>
+              <a:rPr lang="en-US" smtClean="0"/>
+              <a:t>law</a:t>
+            </a:r>
+            <a:endParaRPr lang="en-US" dirty="0" smtClean="0"/>
+          </a:p>
+          <a:p>
+            <a:r>
+              <a:rPr lang="en-US" smtClean="0"/>
+              <a:t>Onderzoeksvraag en aanpak</a:t>
+            </a:r>
+            <a:endParaRPr lang="en-US" dirty="0" smtClean="0"/>
+          </a:p>
+          <a:p>
+            <a:r>
+              <a:rPr lang="en-US" smtClean="0"/>
               <a:t>Narrative</a:t>
             </a:r>
-          </a:p>
-          <a:p>
-            <a:r>
-              <a:rPr lang="en-US" dirty="0" smtClean="0"/>
-              <a:t>Model logic </a:t>
-            </a:r>
-          </a:p>
-          <a:p>
-            <a:r>
-              <a:rPr lang="en-US" dirty="0" smtClean="0"/>
-              <a:t>Verification &amp; Validation</a:t>
-            </a:r>
-          </a:p>
-          <a:p>
-            <a:r>
-              <a:rPr lang="en-US" dirty="0"/>
-              <a:t>Experimental </a:t>
-            </a:r>
-            <a:r>
-              <a:rPr lang="en-US" dirty="0" smtClean="0"/>
-              <a:t>design</a:t>
+            <a:endParaRPr lang="en-US" dirty="0" smtClean="0"/>
+          </a:p>
+          <a:p>
+            <a:r>
+              <a:rPr lang="en-US" smtClean="0"/>
+              <a:t>Model </a:t>
+            </a:r>
+            <a:r>
+              <a:rPr lang="en-US" smtClean="0"/>
+              <a:t>opbouw</a:t>
+            </a:r>
+            <a:r>
+              <a:rPr lang="en-US" smtClean="0"/>
+              <a:t> </a:t>
+            </a:r>
+            <a:endParaRPr lang="en-US" dirty="0" smtClean="0"/>
+          </a:p>
+          <a:p>
+            <a:r>
+              <a:rPr lang="en-US" smtClean="0"/>
+              <a:t>Verificatie &amp; Validatie</a:t>
+            </a:r>
+            <a:endParaRPr lang="en-US" dirty="0" smtClean="0"/>
+          </a:p>
+          <a:p>
+            <a:r>
+              <a:rPr lang="en-US" smtClean="0"/>
+              <a:t>Experimenteel ontwerp</a:t>
             </a:r>
             <a:endParaRPr lang="en-US" dirty="0"/>
           </a:p>
           <a:p>
             <a:r>
-              <a:rPr lang="en-US" dirty="0" smtClean="0"/>
-              <a:t>Model experimentation</a:t>
-            </a:r>
-          </a:p>
-          <a:p>
-            <a:r>
-              <a:rPr lang="en-US" dirty="0" smtClean="0"/>
-              <a:t>Conclusions</a:t>
-            </a:r>
-          </a:p>
-          <a:p>
-            <a:r>
-              <a:rPr lang="en-US" dirty="0"/>
-              <a:t>Future research</a:t>
-            </a:r>
+              <a:rPr lang="en-US" smtClean="0"/>
+              <a:t>Resultaten</a:t>
+            </a:r>
+            <a:endParaRPr lang="en-US" dirty="0" smtClean="0"/>
+          </a:p>
+          <a:p>
+            <a:r>
+              <a:rPr lang="en-US" smtClean="0"/>
+              <a:t>Conclusies</a:t>
+            </a:r>
+            <a:endParaRPr lang="en-US" dirty="0" smtClean="0"/>
+          </a:p>
+          <a:p>
+            <a:r>
+              <a:rPr lang="nl-NL" smtClean="0"/>
+              <a:t>Toekomstig onderzoek</a:t>
+            </a:r>
+            <a:endParaRPr lang="en-US" dirty="0"/>
           </a:p>
           <a:p>
             <a:r>
@@ -18111,8 +18173,17 @@
             </a:r>
             <a:r>
               <a:rPr lang="en-US" dirty="0" smtClean="0"/>
-              <a:t> in practice</a:t>
-            </a:r>
+              <a:t> </a:t>
+            </a:r>
+            <a:r>
+              <a:rPr lang="en-US" smtClean="0"/>
+              <a:t>in </a:t>
+            </a:r>
+            <a:r>
+              <a:rPr lang="en-US" smtClean="0"/>
+              <a:t>de praktijk</a:t>
+            </a:r>
+            <a:endParaRPr lang="en-US" dirty="0" smtClean="0"/>
           </a:p>
         </p:txBody>
       </p:sp>
@@ -18181,8 +18252,8 @@
           <a:lstStyle/>
           <a:p>
             <a:r>
-              <a:rPr lang="en-US" dirty="0" smtClean="0"/>
-              <a:t>Conclusions</a:t>
+              <a:rPr lang="en-US" smtClean="0"/>
+              <a:t>Conclusies</a:t>
             </a:r>
             <a:endParaRPr lang="en-US" dirty="0"/>
           </a:p>
@@ -18201,41 +18272,29 @@
         <p:spPr/>
         <p:txBody>
           <a:bodyPr>
-            <a:normAutofit/>
+            <a:normAutofit lnSpcReduction="10000"/>
           </a:bodyPr>
           <a:lstStyle/>
           <a:p>
             <a:r>
-              <a:rPr lang="en-US" dirty="0" smtClean="0"/>
-              <a:t>Our model is able to produce cities according to a </a:t>
-            </a:r>
-            <a:r>
-              <a:rPr lang="en-US" dirty="0" err="1" smtClean="0"/>
-              <a:t>Zipfian</a:t>
-            </a:r>
-            <a:r>
-              <a:rPr lang="en-US" dirty="0" smtClean="0"/>
-              <a:t> distribution</a:t>
-            </a:r>
-          </a:p>
-          <a:p>
-            <a:r>
-              <a:rPr lang="en-US" dirty="0" smtClean="0"/>
-              <a:t>However, very specific parameter values are needed to obtain a </a:t>
-            </a:r>
-            <a:r>
-              <a:rPr lang="en-US" dirty="0" err="1" smtClean="0"/>
-              <a:t>Zipfian</a:t>
-            </a:r>
-            <a:r>
-              <a:rPr lang="en-US" dirty="0" smtClean="0"/>
-              <a:t> distribution</a:t>
-            </a:r>
-          </a:p>
-          <a:p>
-            <a:r>
-              <a:rPr lang="en-US" dirty="0" smtClean="0"/>
-              <a:t>The </a:t>
+              <a:rPr lang="en-US" smtClean="0"/>
+              <a:t>Het model is in staat steden te produceren volgens de Zipfian distributie</a:t>
+            </a:r>
+            <a:endParaRPr lang="en-US" dirty="0" smtClean="0"/>
+          </a:p>
+          <a:p>
+            <a:r>
+              <a:rPr lang="en-US" smtClean="0"/>
+              <a:t>Echter, specifieke waarden voor de parameters zijn nodig om deze verdeling te verkrijgen </a:t>
+            </a:r>
+          </a:p>
+          <a:p>
+            <a:endParaRPr lang="en-US"/>
+          </a:p>
+          <a:p>
+            <a:r>
+              <a:rPr lang="en-US" smtClean="0"/>
+              <a:t>De </a:t>
             </a:r>
             <a:r>
               <a:rPr lang="en-US" dirty="0" err="1" smtClean="0"/>
@@ -18243,49 +18302,52 @@
             </a:r>
             <a:r>
               <a:rPr lang="en-US" dirty="0" smtClean="0"/>
-              <a:t> law has been around for centuries</a:t>
-            </a:r>
+              <a:t> </a:t>
+            </a:r>
+            <a:r>
+              <a:rPr lang="en-US" smtClean="0"/>
+              <a:t>law </a:t>
+            </a:r>
+            <a:r>
+              <a:rPr lang="en-US" smtClean="0"/>
+              <a:t>bestaat al sinds eeuwen</a:t>
+            </a:r>
+            <a:endParaRPr lang="en-US" dirty="0" smtClean="0"/>
           </a:p>
           <a:p>
             <a:endParaRPr lang="en-US" dirty="0"/>
           </a:p>
           <a:p>
             <a:r>
-              <a:rPr lang="en-US" dirty="0" smtClean="0"/>
-              <a:t>Two variables seem to have the most effect:</a:t>
+              <a:rPr lang="en-US" smtClean="0"/>
+              <a:t>Twee variabelen lijken veel invloed te hebben:</a:t>
             </a:r>
             <a:endParaRPr lang="en-US" dirty="0"/>
           </a:p>
           <a:p>
             <a:pPr lvl="1"/>
             <a:r>
-              <a:rPr lang="en-US" dirty="0" smtClean="0"/>
-              <a:t>The city size effect</a:t>
+              <a:rPr lang="en-US" smtClean="0"/>
+              <a:t>De grootte van de stad</a:t>
             </a:r>
           </a:p>
           <a:p>
             <a:pPr lvl="1"/>
             <a:r>
-              <a:rPr lang="en-US" dirty="0" smtClean="0"/>
-              <a:t>Distance between cities</a:t>
-            </a:r>
+              <a:rPr lang="nl-NL" smtClean="0"/>
+              <a:t>Afstand tussen steden</a:t>
+            </a:r>
+            <a:endParaRPr lang="en-US" dirty="0" smtClean="0"/>
           </a:p>
           <a:p>
             <a:endParaRPr lang="en-US" dirty="0"/>
           </a:p>
           <a:p>
             <a:r>
-              <a:rPr lang="en-US" dirty="0" smtClean="0"/>
-              <a:t>Do we now understand why a </a:t>
-            </a:r>
-            <a:r>
-              <a:rPr lang="en-US" dirty="0" err="1" smtClean="0"/>
-              <a:t>Zipf’s</a:t>
-            </a:r>
-            <a:r>
-              <a:rPr lang="en-US" dirty="0" smtClean="0"/>
-              <a:t> law emerges?</a:t>
-            </a:r>
+              <a:rPr lang="en-US" smtClean="0"/>
+              <a:t>Begrijpen we nu waarom de Zipf’s law ontstaat?</a:t>
+            </a:r>
+            <a:endParaRPr lang="en-US" dirty="0" smtClean="0"/>
           </a:p>
           <a:p>
             <a:pPr marL="365760" lvl="1" indent="0">
@@ -18360,8 +18422,8 @@
           <a:lstStyle/>
           <a:p>
             <a:r>
-              <a:rPr lang="en-US" dirty="0" smtClean="0"/>
-              <a:t>Future Research</a:t>
+              <a:rPr lang="en-US" smtClean="0"/>
+              <a:t>Toekomstig onderzoek</a:t>
             </a:r>
             <a:endParaRPr lang="en-US" dirty="0"/>
           </a:p>
@@ -18383,39 +18445,47 @@
           <a:lstStyle/>
           <a:p>
             <a:r>
-              <a:rPr lang="en-US" dirty="0" smtClean="0"/>
-              <a:t>Why doesn’t the </a:t>
-            </a:r>
-            <a:r>
-              <a:rPr lang="en-US" dirty="0" err="1" smtClean="0"/>
-              <a:t>Zipf’s</a:t>
-            </a:r>
-            <a:r>
-              <a:rPr lang="en-US" dirty="0" smtClean="0"/>
-              <a:t> law fit as well in the Netherlands as it does abroad and how does this affect decision making?</a:t>
-            </a:r>
-          </a:p>
-          <a:p>
+              <a:rPr lang="en-US" smtClean="0"/>
+              <a:t>Waarom fit de Zipf’s law minder goed in Nederland dan in andere landen en hoe beïnvloed dit beleid? </a:t>
+            </a:r>
+          </a:p>
+          <a:p>
+            <a:pPr marL="0" indent="0">
+              <a:buNone/>
+            </a:pPr>
             <a:endParaRPr lang="en-US" dirty="0"/>
           </a:p>
           <a:p>
             <a:r>
-              <a:rPr lang="en-US" dirty="0" smtClean="0"/>
-              <a:t>What happens when European borders disappear entirely?</a:t>
+              <a:rPr lang="en-US" smtClean="0"/>
+              <a:t>Wat gebeurt er wanneer Europese grenzen compleet verdwijnen? </a:t>
             </a:r>
           </a:p>
           <a:p>
             <a:pPr lvl="1"/>
             <a:r>
-              <a:rPr lang="en-US" dirty="0" smtClean="0"/>
-              <a:t>Will Paris or London become the most important city?</a:t>
-            </a:r>
+              <a:rPr lang="en-US" smtClean="0"/>
+              <a:t>Zal </a:t>
+            </a:r>
+            <a:r>
+              <a:rPr lang="en-US" smtClean="0"/>
+              <a:t>Paris of </a:t>
+            </a:r>
+            <a:r>
+              <a:rPr lang="en-US" smtClean="0"/>
+              <a:t>London </a:t>
+            </a:r>
+            <a:r>
+              <a:rPr lang="en-US" smtClean="0"/>
+              <a:t>de grootste stad worden?</a:t>
+            </a:r>
+            <a:endParaRPr lang="en-US" dirty="0" smtClean="0"/>
           </a:p>
           <a:p>
             <a:pPr lvl="1"/>
             <a:r>
-              <a:rPr lang="en-US" dirty="0" smtClean="0"/>
-              <a:t>What will happen to our cities?</a:t>
+              <a:rPr lang="en-US" smtClean="0"/>
+              <a:t>Wat gebeurt er met de grootste Nederlandse steden?</a:t>
             </a:r>
             <a:endParaRPr lang="en-US" dirty="0"/>
           </a:p>
@@ -18491,7 +18561,15 @@
             </a:r>
             <a:r>
               <a:rPr lang="en-US" dirty="0" smtClean="0"/>
-              <a:t> in Practice</a:t>
+              <a:t> </a:t>
+            </a:r>
+            <a:r>
+              <a:rPr lang="en-US" smtClean="0"/>
+              <a:t>in </a:t>
+            </a:r>
+            <a:r>
+              <a:rPr lang="en-US" smtClean="0"/>
+              <a:t>de praktijk</a:t>
             </a:r>
             <a:endParaRPr lang="en-US" dirty="0"/>
           </a:p>
@@ -18515,41 +18593,61 @@
         </p:spPr>
         <p:txBody>
           <a:bodyPr>
-            <a:normAutofit lnSpcReduction="10000"/>
+            <a:normAutofit/>
           </a:bodyPr>
           <a:lstStyle/>
           <a:p>
             <a:r>
-              <a:rPr lang="en-US" dirty="0" err="1" smtClean="0"/>
+              <a:rPr lang="en-US" err="1" smtClean="0"/>
               <a:t>Netlogo</a:t>
             </a:r>
             <a:r>
-              <a:rPr lang="en-US" dirty="0" smtClean="0"/>
-              <a:t> is all about turtles, and it moves about as fast as one</a:t>
-            </a:r>
-          </a:p>
-          <a:p>
+              <a:rPr lang="en-US" smtClean="0"/>
+              <a:t> </a:t>
+            </a:r>
+            <a:r>
+              <a:rPr lang="en-US" smtClean="0"/>
+              <a:t>is relatief langzaam</a:t>
+            </a:r>
             <a:endParaRPr lang="en-US" dirty="0"/>
           </a:p>
           <a:p>
             <a:r>
-              <a:rPr lang="en-US" dirty="0" smtClean="0"/>
-              <a:t>Too much time spent on making model run at reasonable speeds</a:t>
-            </a:r>
+              <a:rPr lang="en-US" smtClean="0"/>
+              <a:t>Teveel tijd besteed aan het sneller maken van het model</a:t>
+            </a:r>
+            <a:endParaRPr lang="en-US"/>
+          </a:p>
+          <a:p>
+            <a:r>
+              <a:rPr lang="en-US" smtClean="0"/>
+              <a:t>Tabel implementatie </a:t>
+            </a:r>
+            <a:r>
+              <a:rPr lang="en-US" smtClean="0"/>
+              <a:t>100x </a:t>
+            </a:r>
+            <a:r>
+              <a:rPr lang="en-US" smtClean="0"/>
+              <a:t>langzamer dan list</a:t>
+            </a:r>
+            <a:r>
+              <a:rPr lang="en-US" smtClean="0"/>
+              <a:t> </a:t>
+            </a:r>
+            <a:endParaRPr lang="en-US" dirty="0" smtClean="0"/>
           </a:p>
           <a:p>
             <a:pPr lvl="1"/>
             <a:r>
-              <a:rPr lang="en-US" dirty="0" smtClean="0"/>
-              <a:t>Table implementation 100x slower than regular list </a:t>
-            </a:r>
-          </a:p>
-          <a:p>
-            <a:pPr lvl="1"/>
-            <a:r>
-              <a:rPr lang="en-US" dirty="0" smtClean="0"/>
-              <a:t>Subtracting sets undoable</a:t>
-            </a:r>
+              <a:rPr lang="en-US" smtClean="0"/>
+              <a:t>Sets van elkaar aftrekken </a:t>
+            </a:r>
+            <a:r>
+              <a:rPr lang="en-US" smtClean="0"/>
+              <a:t>is niet te doen</a:t>
+            </a:r>
+            <a:endParaRPr lang="en-US" dirty="0" smtClean="0"/>
           </a:p>
           <a:p>
             <a:pPr lvl="1"/>
@@ -18557,12 +18655,22 @@
           </a:p>
           <a:p>
             <a:r>
-              <a:rPr lang="en-US" dirty="0" smtClean="0"/>
-              <a:t>No support for unit testing or assertions</a:t>
-            </a:r>
-          </a:p>
-          <a:p>
-            <a:endParaRPr lang="en-US" dirty="0"/>
+              <a:rPr lang="en-US" smtClean="0"/>
+              <a:t>Geen ondersteuning voor </a:t>
+            </a:r>
+            <a:r>
+              <a:rPr lang="en-US" smtClean="0"/>
+              <a:t>unit </a:t>
+            </a:r>
+            <a:r>
+              <a:rPr lang="en-US" smtClean="0"/>
+              <a:t>tests of </a:t>
+            </a:r>
+            <a:r>
+              <a:rPr lang="en-US" i="1" smtClean="0"/>
+              <a:t>assertions</a:t>
+            </a:r>
+            <a:endParaRPr lang="en-US" i="1" dirty="0"/>
           </a:p>
           <a:p>
             <a:r>
@@ -18580,8 +18688,8 @@
           </a:p>
           <a:p>
             <a:r>
-              <a:rPr lang="en-US" dirty="0" smtClean="0"/>
-              <a:t>Overall unsuitable due to speed limitations</a:t>
+              <a:rPr lang="en-US" smtClean="0"/>
+              <a:t>In het algemeen ongeschikt wegens snelheidsbeperkingen</a:t>
             </a:r>
             <a:endParaRPr lang="en-US" dirty="0"/>
           </a:p>
@@ -18653,11 +18761,15 @@
           <a:p>
             <a:r>
               <a:rPr lang="en-US" dirty="0" smtClean="0"/>
-              <a:t>Model files &amp; </a:t>
-            </a:r>
-            <a:r>
-              <a:rPr lang="en-US" dirty="0" err="1" smtClean="0"/>
-              <a:t>Referenes</a:t>
+              <a:t>Model files </a:t>
+            </a:r>
+            <a:r>
+              <a:rPr lang="en-US" smtClean="0"/>
+              <a:t>&amp; </a:t>
+            </a:r>
+            <a:r>
+              <a:rPr lang="en-US" smtClean="0"/>
+              <a:t>Referenties</a:t>
             </a:r>
             <a:endParaRPr lang="en-US" dirty="0"/>
           </a:p>
@@ -18681,16 +18793,11 @@
           <a:lstStyle/>
           <a:p>
             <a:r>
-              <a:rPr lang="en-US" altLang="en-US" dirty="0" smtClean="0">
+              <a:rPr lang="en-US" altLang="en-US" smtClean="0">
                 <a:latin typeface="+mj-lt"/>
               </a:rPr>
-              <a:t>If you’re interested in the model files and documentation, please visit:</a:t>
-            </a:r>
-          </a:p>
-          <a:p>
-            <a:pPr marL="0" indent="0" algn="ctr">
-              <a:buNone/>
-            </a:pPr>
+              <a:t>Als u geïnteresseerd bent in de model files en documentatie, dan refereren wij naar de volgende website:</a:t>
+            </a:r>
             <a:endParaRPr lang="en-US" altLang="en-US" dirty="0">
               <a:latin typeface="+mj-lt"/>
               <a:hlinkClick r:id="rId2"/>
@@ -18735,11 +18842,14 @@
           </a:p>
           <a:p>
             <a:r>
-              <a:rPr lang="en-US" altLang="en-US" dirty="0" smtClean="0">
+              <a:rPr lang="en-US" altLang="en-US" smtClean="0">
                 <a:latin typeface="+mj-lt"/>
               </a:rPr>
-              <a:t>References</a:t>
-            </a:r>
+              <a:t>Referencies:</a:t>
+            </a:r>
+            <a:endParaRPr lang="en-US" altLang="en-US" dirty="0" smtClean="0">
+              <a:latin typeface="+mj-lt"/>
+            </a:endParaRPr>
           </a:p>
           <a:p>
             <a:r>
@@ -18922,16 +19032,12 @@
           <a:lstStyle/>
           <a:p>
             <a:r>
+              <a:rPr lang="en-US" smtClean="0"/>
+              <a:t>Zipf’s </a:t>
+            </a:r>
+            <a:r>
               <a:rPr lang="en-US" dirty="0" smtClean="0"/>
-              <a:t>CPB and </a:t>
-            </a:r>
-            <a:r>
-              <a:rPr lang="en-US" dirty="0" err="1" smtClean="0"/>
-              <a:t>Zipf’s</a:t>
-            </a:r>
-            <a:r>
-              <a:rPr lang="en-US" dirty="0" smtClean="0"/>
-              <a:t> Law</a:t>
+              <a:t>Law</a:t>
             </a:r>
             <a:endParaRPr lang="en-US" dirty="0"/>
           </a:p>
@@ -18953,17 +19059,10 @@
           <a:lstStyle/>
           <a:p>
             <a:r>
-              <a:rPr lang="en-US" dirty="0" smtClean="0"/>
-              <a:t>The largest cities in a country show a </a:t>
-            </a:r>
-            <a:r>
-              <a:rPr lang="en-US" dirty="0" err="1" smtClean="0"/>
-              <a:t>Zipfian</a:t>
-            </a:r>
-            <a:r>
-              <a:rPr lang="en-US" dirty="0" smtClean="0"/>
-              <a:t> distribution</a:t>
-            </a:r>
+              <a:rPr lang="en-US" smtClean="0"/>
+              <a:t>De grootste steden in een land volgen de Zipfian distributie</a:t>
+            </a:r>
+            <a:endParaRPr lang="en-US" dirty="0" smtClean="0"/>
           </a:p>
           <a:p>
             <a:endParaRPr lang="en-US" dirty="0"/>
@@ -19065,16 +19164,12 @@
           <a:lstStyle/>
           <a:p>
             <a:r>
+              <a:rPr lang="en-US" smtClean="0"/>
+              <a:t>Zipf’s </a:t>
+            </a:r>
+            <a:r>
               <a:rPr lang="en-US" dirty="0" smtClean="0"/>
-              <a:t>CPB and </a:t>
-            </a:r>
-            <a:r>
-              <a:rPr lang="en-US" dirty="0" err="1" smtClean="0"/>
-              <a:t>Zipf’s</a:t>
-            </a:r>
-            <a:r>
-              <a:rPr lang="en-US" dirty="0" smtClean="0"/>
-              <a:t> Law</a:t>
+              <a:t>Law</a:t>
             </a:r>
             <a:endParaRPr lang="en-US" dirty="0"/>
           </a:p>
@@ -19096,16 +19191,8 @@
           <a:lstStyle/>
           <a:p>
             <a:r>
-              <a:rPr lang="en-US" dirty="0" smtClean="0"/>
-              <a:t>The largest cities in a country show a </a:t>
-            </a:r>
-            <a:r>
-              <a:rPr lang="en-US" dirty="0" err="1" smtClean="0"/>
-              <a:t>Zipfian</a:t>
-            </a:r>
-            <a:r>
-              <a:rPr lang="en-US" dirty="0" smtClean="0"/>
-              <a:t> distribution</a:t>
+              <a:rPr lang="en-US"/>
+              <a:t>De grootste steden in een land volgen de Zipfian distributie</a:t>
             </a:r>
           </a:p>
           <a:p>
@@ -19232,16 +19319,12 @@
           <a:lstStyle/>
           <a:p>
             <a:r>
+              <a:rPr lang="en-US" smtClean="0"/>
+              <a:t>Zipf’s </a:t>
+            </a:r>
+            <a:r>
               <a:rPr lang="en-US" dirty="0" smtClean="0"/>
-              <a:t>CPB and </a:t>
-            </a:r>
-            <a:r>
-              <a:rPr lang="en-US" dirty="0" err="1" smtClean="0"/>
-              <a:t>Zipf’s</a:t>
-            </a:r>
-            <a:r>
-              <a:rPr lang="en-US" dirty="0" smtClean="0"/>
-              <a:t> Law</a:t>
+              <a:t>Law</a:t>
             </a:r>
             <a:endParaRPr lang="en-US" dirty="0"/>
           </a:p>
@@ -19447,39 +19530,37 @@
           </a:lstStyle>
           <a:p>
             <a:r>
-              <a:rPr lang="en-US" dirty="0" smtClean="0"/>
-              <a:t>CPB:</a:t>
+              <a:rPr lang="nl-NL" smtClean="0"/>
+              <a:t>Kunnen we dit soort stedengroei beïnvloeden?</a:t>
+            </a:r>
+            <a:endParaRPr lang="en-US" smtClean="0"/>
+          </a:p>
+          <a:p>
+            <a:endParaRPr lang="nl-NL" smtClean="0"/>
+          </a:p>
+          <a:p>
+            <a:r>
+              <a:rPr lang="nl-NL" smtClean="0"/>
+              <a:t>Kunnen we beleidsmaatregelen ontwerpen, wetende dat deze verdeling van stedengroottes bestaat?</a:t>
+            </a:r>
+            <a:endParaRPr lang="en-US" smtClean="0"/>
+          </a:p>
+          <a:p>
+            <a:endParaRPr lang="nl-NL" smtClean="0"/>
+          </a:p>
+          <a:p>
+            <a:r>
+              <a:rPr lang="nl-NL" smtClean="0"/>
+              <a:t>Om deze vragen te beantwoorden:</a:t>
             </a:r>
           </a:p>
           <a:p>
             <a:pPr lvl="1"/>
             <a:r>
-              <a:rPr lang="en-US" dirty="0" smtClean="0"/>
-              <a:t>Can we influence this type of city growth?</a:t>
-            </a:r>
-          </a:p>
-          <a:p>
-            <a:pPr lvl="1"/>
-            <a:r>
-              <a:rPr lang="en-US" dirty="0" smtClean="0"/>
-              <a:t>Can we design policies knowing this type of behaviour occurs?</a:t>
-            </a:r>
-          </a:p>
-          <a:p>
-            <a:pPr lvl="1"/>
-            <a:r>
-              <a:rPr lang="en-US" dirty="0" smtClean="0"/>
-              <a:t>What causes the </a:t>
-            </a:r>
-            <a:r>
-              <a:rPr lang="en-US" dirty="0" err="1" smtClean="0"/>
-              <a:t>Zipf’s</a:t>
-            </a:r>
-            <a:r>
-              <a:rPr lang="en-US" dirty="0" smtClean="0"/>
-              <a:t> law to emerge?</a:t>
-            </a:r>
-            <a:endParaRPr lang="en-US" dirty="0"/>
+              <a:rPr lang="nl-NL" smtClean="0"/>
+              <a:t>Waardoor onstaat de Zipf’s law?</a:t>
+            </a:r>
+            <a:endParaRPr lang="en-US" smtClean="0"/>
           </a:p>
         </p:txBody>
       </p:sp>
@@ -19548,8 +19629,8 @@
           <a:lstStyle/>
           <a:p>
             <a:r>
-              <a:rPr lang="en-US" dirty="0" smtClean="0"/>
-              <a:t>Research question &amp; Approach</a:t>
+              <a:rPr lang="en-US" smtClean="0"/>
+              <a:t>Onderzoeksvraag &amp; Aanpak</a:t>
             </a:r>
             <a:endParaRPr lang="en-US" dirty="0"/>
           </a:p>
@@ -19568,19 +19649,28 @@
         <p:spPr>
           <a:xfrm>
             <a:off x="457200" y="1600200"/>
-            <a:ext cx="7696200" cy="4873752"/>
+            <a:ext cx="7924800" cy="4873752"/>
           </a:xfrm>
         </p:spPr>
         <p:txBody>
           <a:bodyPr>
-            <a:normAutofit/>
+            <a:normAutofit lnSpcReduction="10000"/>
           </a:bodyPr>
           <a:lstStyle/>
           <a:p>
             <a:r>
               <a:rPr lang="en-US" dirty="0" smtClean="0"/>
-              <a:t>Focus: Decisions made on household level</a:t>
-            </a:r>
+              <a:t>Focus</a:t>
+            </a:r>
+            <a:r>
+              <a:rPr lang="en-US" smtClean="0"/>
+              <a:t>: </a:t>
+            </a:r>
+            <a:r>
+              <a:rPr lang="en-US" smtClean="0"/>
+              <a:t>Keuzes op het niveau van huishoudens</a:t>
+            </a:r>
+            <a:endParaRPr lang="en-US" dirty="0" smtClean="0"/>
           </a:p>
           <a:p>
             <a:endParaRPr lang="en-US" dirty="0"/>
@@ -19596,8 +19686,8 @@
               <a:buNone/>
             </a:pPr>
             <a:r>
-              <a:rPr lang="en-US" dirty="0" smtClean="0"/>
-              <a:t>Research question:</a:t>
+              <a:rPr lang="en-US" smtClean="0"/>
+              <a:t>Hoofdvraag:</a:t>
             </a:r>
           </a:p>
           <a:p>
@@ -19605,17 +19695,10 @@
               <a:buNone/>
             </a:pPr>
             <a:r>
-              <a:rPr lang="en-US" sz="1800" i="1" dirty="0" smtClean="0"/>
-              <a:t>How do decisions made at household level influence moving behaviour between cities to cause the emergence of the </a:t>
-            </a:r>
-            <a:r>
-              <a:rPr lang="en-US" sz="1800" i="1" dirty="0" err="1" smtClean="0"/>
-              <a:t>Zipf’s</a:t>
-            </a:r>
-            <a:r>
-              <a:rPr lang="en-US" sz="1800" i="1" dirty="0" smtClean="0"/>
-              <a:t> law?</a:t>
-            </a:r>
+              <a:rPr lang="nl-NL" sz="1800" i="1" smtClean="0"/>
+              <a:t>Hoe beïnvloeden beslissingen op huishoudniveau het verhuisgedrag tussen steden zodat de Zipf’s law ontstaat?</a:t>
+            </a:r>
+            <a:endParaRPr lang="en-US" sz="1800" i="1" dirty="0" smtClean="0"/>
           </a:p>
           <a:p>
             <a:endParaRPr lang="en-US" i="1" dirty="0" smtClean="0"/>
@@ -19625,29 +19708,39 @@
           </a:p>
           <a:p>
             <a:r>
-              <a:rPr lang="en-US" dirty="0" smtClean="0"/>
-              <a:t>Approach:</a:t>
-            </a:r>
+              <a:rPr lang="en-US" smtClean="0"/>
+              <a:t>Aanpak:</a:t>
+            </a:r>
+            <a:endParaRPr lang="en-US" dirty="0" smtClean="0"/>
           </a:p>
           <a:p>
             <a:pPr lvl="1"/>
             <a:r>
-              <a:rPr lang="en-US" dirty="0" smtClean="0"/>
-              <a:t>Literature research: for what reasons do people move?</a:t>
-            </a:r>
+              <a:rPr lang="en-US" smtClean="0"/>
+              <a:t>Literatuur onderzoek: waarom verhuist een huishouden?</a:t>
+            </a:r>
+            <a:endParaRPr lang="en-US" dirty="0" smtClean="0"/>
           </a:p>
           <a:p>
             <a:pPr lvl="2"/>
             <a:r>
-              <a:rPr lang="en-US" dirty="0" smtClean="0"/>
-              <a:t>Stage of Life </a:t>
-            </a:r>
+              <a:rPr lang="en-US" smtClean="0"/>
+              <a:t>Levensfase</a:t>
+            </a:r>
+            <a:endParaRPr lang="en-US" dirty="0" smtClean="0"/>
           </a:p>
           <a:p>
             <a:pPr lvl="2"/>
             <a:r>
-              <a:rPr lang="en-US" dirty="0" smtClean="0"/>
-              <a:t>Job opportunities</a:t>
+              <a:rPr lang="nl-NL" smtClean="0"/>
+              <a:t>Werk mogelijkheden</a:t>
+            </a:r>
+          </a:p>
+          <a:p>
+            <a:pPr lvl="2"/>
+            <a:r>
+              <a:rPr lang="nl-NL" smtClean="0"/>
+              <a:t>Overig concepten</a:t>
             </a:r>
             <a:endParaRPr lang="en-US" dirty="0"/>
           </a:p>
@@ -19741,7 +19834,7 @@
         <p:spPr>
           <a:xfrm>
             <a:off x="3962400" y="4114800"/>
-            <a:ext cx="1368152" cy="369332"/>
+            <a:ext cx="1524000" cy="369332"/>
           </a:xfrm>
           <a:prstGeom prst="rect">
             <a:avLst/>
@@ -19755,10 +19848,10 @@
           <a:lstStyle/>
           <a:p>
             <a:r>
-              <a:rPr lang="en-US" b="1" i="1" dirty="0" smtClean="0">
+              <a:rPr lang="en-US" b="1" i="1" smtClean="0">
                 <a:latin typeface="Cambria" panose="02040503050406030204" pitchFamily="18" charset="0"/>
               </a:rPr>
-              <a:t>Life cycle</a:t>
+              <a:t>Levensfases</a:t>
             </a:r>
             <a:endParaRPr lang="en-US" b="1" i="1" dirty="0">
               <a:latin typeface="Cambria" panose="02040503050406030204" pitchFamily="18" charset="0"/>
@@ -19797,8 +19890,8 @@
         </p:nvSpPr>
         <p:spPr>
           <a:xfrm>
-            <a:off x="4953000" y="838200"/>
-            <a:ext cx="2441848" cy="584775"/>
+            <a:off x="3540882" y="1095461"/>
+            <a:ext cx="2667000" cy="584775"/>
           </a:xfrm>
           <a:prstGeom prst="rect">
             <a:avLst/>
@@ -19812,8 +19905,12 @@
           <a:lstStyle/>
           <a:p>
             <a:r>
-              <a:rPr lang="en-US" sz="1600" dirty="0" smtClean="0"/>
-              <a:t>65+ Move less and prefer the countryside</a:t>
+              <a:rPr lang="en-US" sz="1600" smtClean="0"/>
+              <a:t>65</a:t>
+            </a:r>
+            <a:r>
+              <a:rPr lang="en-US" sz="1600" smtClean="0"/>
+              <a:t>+ verhuizen minder en preferen het platteland</a:t>
             </a:r>
             <a:endParaRPr lang="en-US" sz="1600" dirty="0"/>
           </a:p>
@@ -19827,8 +19924,8 @@
         </p:nvSpPr>
         <p:spPr>
           <a:xfrm>
-            <a:off x="6477000" y="2133600"/>
-            <a:ext cx="2286000" cy="1077218"/>
+            <a:off x="6705600" y="2133600"/>
+            <a:ext cx="2209800" cy="1323439"/>
           </a:xfrm>
           <a:prstGeom prst="rect">
             <a:avLst/>
@@ -19842,9 +19939,22 @@
           <a:lstStyle/>
           <a:p>
             <a:r>
+              <a:rPr lang="en-US" sz="1600" smtClean="0"/>
+              <a:t>Jong volwassenen </a:t>
+            </a:r>
+            <a:r>
               <a:rPr lang="en-US" sz="1600" dirty="0" smtClean="0"/>
-              <a:t>Children (16-23) move out to more attractive    city, a new household is formed</a:t>
-            </a:r>
+              <a:t>(</a:t>
+            </a:r>
+            <a:r>
+              <a:rPr lang="en-US" sz="1600" smtClean="0"/>
+              <a:t>16-23</a:t>
+            </a:r>
+            <a:r>
+              <a:rPr lang="en-US" sz="1600" smtClean="0"/>
+              <a:t>) verlaten het ouderlijk huis naar de voor hen meest interessante stad</a:t>
+            </a:r>
+            <a:endParaRPr lang="en-US" sz="1600" dirty="0" smtClean="0"/>
           </a:p>
         </p:txBody>
       </p:sp>
@@ -19856,8 +19966,8 @@
         </p:nvSpPr>
         <p:spPr>
           <a:xfrm>
-            <a:off x="6244952" y="5874603"/>
-            <a:ext cx="2441848" cy="830997"/>
+            <a:off x="6019800" y="6019800"/>
+            <a:ext cx="2743200" cy="830997"/>
           </a:xfrm>
           <a:prstGeom prst="rect">
             <a:avLst/>
@@ -19871,28 +19981,8 @@
           <a:lstStyle/>
           <a:p>
             <a:r>
-              <a:rPr lang="en-US" sz="1600" dirty="0" smtClean="0"/>
-              <a:t>Couples form in </a:t>
-            </a:r>
-          </a:p>
-          <a:p>
-            <a:r>
-              <a:rPr lang="en-US" sz="1600" dirty="0"/>
-              <a:t>t</a:t>
-            </a:r>
-            <a:r>
-              <a:rPr lang="en-US" sz="1600" dirty="0" smtClean="0"/>
-              <a:t>he same city,</a:t>
-            </a:r>
-          </a:p>
-          <a:p>
-            <a:r>
-              <a:rPr lang="en-US" sz="1600" dirty="0"/>
-              <a:t>h</a:t>
-            </a:r>
-            <a:r>
-              <a:rPr lang="en-US" sz="1600" dirty="0" smtClean="0"/>
-              <a:t>ouseholds merge</a:t>
+              <a:rPr lang="nl-NL" sz="1600" smtClean="0"/>
+              <a:t>Koppels vormen in dezelfde stad, huishoudens worden samengevoegd</a:t>
             </a:r>
             <a:endParaRPr lang="en-US" sz="1600" dirty="0"/>
           </a:p>
@@ -19906,8 +19996,8 @@
         </p:nvSpPr>
         <p:spPr>
           <a:xfrm>
-            <a:off x="1295400" y="5714999"/>
-            <a:ext cx="2441848" cy="830997"/>
+            <a:off x="254656" y="6027003"/>
+            <a:ext cx="3280048" cy="830997"/>
           </a:xfrm>
           <a:prstGeom prst="rect">
             <a:avLst/>
@@ -19921,8 +20011,8 @@
           <a:lstStyle/>
           <a:p>
             <a:r>
-              <a:rPr lang="en-US" sz="1600" dirty="0" smtClean="0"/>
-              <a:t>Couples (23-40) reproduce, their household grows</a:t>
+              <a:rPr lang="en-US" sz="1600" smtClean="0"/>
+              <a:t>Koppels krijgen kinderen, het huishouden groeit, ze verhuizen niet vaak tussen steden</a:t>
             </a:r>
             <a:endParaRPr lang="en-US" sz="1600" dirty="0"/>
           </a:p>
@@ -19936,8 +20026,8 @@
         </p:nvSpPr>
         <p:spPr>
           <a:xfrm>
-            <a:off x="6778352" y="3962400"/>
-            <a:ext cx="2441848" cy="584775"/>
+            <a:off x="7189334" y="4180582"/>
+            <a:ext cx="1802266" cy="1077218"/>
           </a:xfrm>
           <a:prstGeom prst="rect">
             <a:avLst/>
@@ -19951,18 +20041,38 @@
           <a:lstStyle/>
           <a:p>
             <a:r>
-              <a:rPr lang="en-US" sz="1600" dirty="0" smtClean="0"/>
-              <a:t>Young adults move</a:t>
-            </a:r>
-          </a:p>
-          <a:p>
-            <a:r>
-              <a:rPr lang="en-US" sz="1600" dirty="0"/>
-              <a:t> </a:t>
-            </a:r>
-            <a:r>
-              <a:rPr lang="en-US" sz="1600" dirty="0" smtClean="0"/>
-              <a:t>   very often</a:t>
+              <a:rPr lang="en-US" sz="1600" smtClean="0"/>
+              <a:t>Jong volwassenen verhuizen relatief vaak</a:t>
+            </a:r>
+            <a:endParaRPr lang="en-US" sz="1600" dirty="0"/>
+          </a:p>
+        </p:txBody>
+      </p:sp>
+      <p:sp>
+        <p:nvSpPr>
+          <p:cNvPr id="10" name="TextBox 25"/>
+          <p:cNvSpPr txBox="1"/>
+          <p:nvPr/>
+        </p:nvSpPr>
+        <p:spPr>
+          <a:xfrm>
+            <a:off x="254656" y="2209800"/>
+            <a:ext cx="2414451" cy="1323439"/>
+          </a:xfrm>
+          <a:prstGeom prst="rect">
+            <a:avLst/>
+          </a:prstGeom>
+          <a:noFill/>
+        </p:spPr>
+        <p:txBody>
+          <a:bodyPr wrap="square" rtlCol="0">
+            <a:spAutoFit/>
+          </a:bodyPr>
+          <a:lstStyle/>
+          <a:p>
+            <a:r>
+              <a:rPr lang="en-US" sz="1600" smtClean="0"/>
+              <a:t>Een huishouden verhuist naar een andere stad gebaseerd op de levensfase en andere invloeden</a:t>
             </a:r>
             <a:endParaRPr lang="en-US" sz="1600" dirty="0"/>
           </a:p>
@@ -20078,10 +20188,10 @@
         </p:nvGrpSpPr>
         <p:grpSpPr>
           <a:xfrm>
-            <a:off x="4114800" y="2065962"/>
-            <a:ext cx="4829680" cy="3077932"/>
-            <a:chOff x="4422840" y="2065962"/>
-            <a:chExt cx="4829680" cy="3077932"/>
+            <a:off x="4011752" y="2065962"/>
+            <a:ext cx="4932728" cy="3277143"/>
+            <a:chOff x="4319792" y="2065962"/>
+            <a:chExt cx="4932728" cy="3277143"/>
           </a:xfrm>
         </p:grpSpPr>
         <p:sp>
@@ -20092,8 +20202,8 @@
           </p:nvSpPr>
           <p:spPr>
             <a:xfrm>
-              <a:off x="4633122" y="3024578"/>
-              <a:ext cx="730966" cy="369332"/>
+              <a:off x="4319792" y="2983468"/>
+              <a:ext cx="941248" cy="369332"/>
             </a:xfrm>
             <a:prstGeom prst="rect">
               <a:avLst/>
@@ -20107,10 +20217,10 @@
             <a:lstStyle/>
             <a:p>
               <a:r>
-                <a:rPr lang="en-US" i="1" dirty="0" smtClean="0">
+                <a:rPr lang="en-US" i="1" smtClean="0">
                   <a:latin typeface="Cambria" panose="02040503050406030204" pitchFamily="18" charset="0"/>
                 </a:rPr>
-                <a:t>Age</a:t>
+                <a:t>Leeftijd</a:t>
               </a:r>
               <a:endParaRPr lang="en-US" i="1" dirty="0">
                 <a:latin typeface="Cambria" panose="02040503050406030204" pitchFamily="18" charset="0"/>
@@ -20127,7 +20237,7 @@
           <p:spPr>
             <a:xfrm>
               <a:off x="4549063" y="2065962"/>
-              <a:ext cx="1877352" cy="369332"/>
+              <a:ext cx="1877352" cy="646331"/>
             </a:xfrm>
             <a:prstGeom prst="rect">
               <a:avLst/>
@@ -20141,10 +20251,10 @@
             <a:lstStyle/>
             <a:p>
               <a:r>
-                <a:rPr lang="en-US" i="1" dirty="0" smtClean="0">
+                <a:rPr lang="en-US" i="1" smtClean="0">
                   <a:latin typeface="Cambria" panose="02040503050406030204" pitchFamily="18" charset="0"/>
                 </a:rPr>
-                <a:t>Having children</a:t>
+                <a:t>Het hebben van kinderen</a:t>
               </a:r>
               <a:endParaRPr lang="en-US" i="1" dirty="0">
                 <a:latin typeface="Cambria" panose="02040503050406030204" pitchFamily="18" charset="0"/>
@@ -20161,7 +20271,7 @@
           <p:spPr>
             <a:xfrm>
               <a:off x="6918620" y="2070422"/>
-              <a:ext cx="1757835" cy="369332"/>
+              <a:ext cx="2152420" cy="369332"/>
             </a:xfrm>
             <a:prstGeom prst="rect">
               <a:avLst/>
@@ -20175,10 +20285,10 @@
             <a:lstStyle/>
             <a:p>
               <a:r>
-                <a:rPr lang="en-US" i="1" dirty="0" smtClean="0">
+                <a:rPr lang="en-US" i="1" smtClean="0">
                   <a:latin typeface="Cambria" panose="02040503050406030204" pitchFamily="18" charset="0"/>
                 </a:rPr>
-                <a:t>Borrowed utility</a:t>
+                <a:t>“Borrowed utility”</a:t>
               </a:r>
               <a:endParaRPr lang="en-US" i="1" dirty="0">
                 <a:latin typeface="Cambria" panose="02040503050406030204" pitchFamily="18" charset="0"/>
@@ -20194,8 +20304,8 @@
           </p:nvSpPr>
           <p:spPr>
             <a:xfrm>
-              <a:off x="4422840" y="4089556"/>
-              <a:ext cx="1234953" cy="646331"/>
+              <a:off x="4422840" y="4078069"/>
+              <a:ext cx="1371600" cy="646331"/>
             </a:xfrm>
             <a:prstGeom prst="rect">
               <a:avLst/>
@@ -20209,10 +20319,10 @@
             <a:lstStyle/>
             <a:p>
               <a:r>
-                <a:rPr lang="en-US" i="1" dirty="0" smtClean="0">
+                <a:rPr lang="nl-NL" i="1" smtClean="0">
                   <a:latin typeface="Cambria" panose="02040503050406030204" pitchFamily="18" charset="0"/>
                 </a:rPr>
-                <a:t>Time since moving</a:t>
+                <a:t>Tijd sinds verhuizing</a:t>
               </a:r>
               <a:endParaRPr lang="en-US" i="1" dirty="0">
                 <a:latin typeface="Cambria" panose="02040503050406030204" pitchFamily="18" charset="0"/>
@@ -20228,8 +20338,8 @@
           </p:nvSpPr>
           <p:spPr>
             <a:xfrm>
-              <a:off x="5583992" y="4774562"/>
-              <a:ext cx="1955102" cy="369332"/>
+              <a:off x="5583992" y="4973773"/>
+              <a:ext cx="2410838" cy="369332"/>
             </a:xfrm>
             <a:prstGeom prst="rect">
               <a:avLst/>
@@ -20243,10 +20353,10 @@
             <a:lstStyle/>
             <a:p>
               <a:r>
-                <a:rPr lang="en-US" i="1" dirty="0" smtClean="0">
+                <a:rPr lang="nl-NL" i="1" smtClean="0">
                   <a:latin typeface="Cambria" panose="02040503050406030204" pitchFamily="18" charset="0"/>
                 </a:rPr>
-                <a:t>Job attractiveness</a:t>
+                <a:t>Baan aantrekkelijkheid</a:t>
               </a:r>
               <a:endParaRPr lang="en-US" i="1" dirty="0">
                 <a:latin typeface="Cambria" panose="02040503050406030204" pitchFamily="18" charset="0"/>
@@ -20277,10 +20387,10 @@
             <a:lstStyle/>
             <a:p>
               <a:r>
-                <a:rPr lang="en-US" i="1" dirty="0" smtClean="0">
+                <a:rPr lang="en-US" i="1" smtClean="0">
                   <a:latin typeface="Cambria" panose="02040503050406030204" pitchFamily="18" charset="0"/>
                 </a:rPr>
-                <a:t>Distance from current location</a:t>
+                <a:t>Afstand vanaf huidige locatie</a:t>
               </a:r>
               <a:endParaRPr lang="en-US" i="1" dirty="0">
                 <a:latin typeface="Cambria" panose="02040503050406030204" pitchFamily="18" charset="0"/>
@@ -20296,7 +20406,7 @@
           </p:nvSpPr>
           <p:spPr>
             <a:xfrm>
-              <a:off x="7596336" y="2826022"/>
+              <a:off x="7596336" y="2667000"/>
               <a:ext cx="1224136" cy="646331"/>
             </a:xfrm>
             <a:prstGeom prst="rect">
@@ -20311,18 +20421,10 @@
             <a:lstStyle/>
             <a:p>
               <a:r>
-                <a:rPr lang="en-US" i="1" dirty="0" smtClean="0">
+                <a:rPr lang="en-US" i="1" smtClean="0">
                   <a:latin typeface="Cambria" panose="02040503050406030204" pitchFamily="18" charset="0"/>
                 </a:rPr>
-                <a:t>City size </a:t>
-              </a:r>
-            </a:p>
-            <a:p>
-              <a:r>
-                <a:rPr lang="en-US" i="1" dirty="0" smtClean="0">
-                  <a:latin typeface="Cambria" panose="02040503050406030204" pitchFamily="18" charset="0"/>
-                </a:rPr>
-                <a:t>(facilities)</a:t>
+                <a:t>Grootte van steden</a:t>
               </a:r>
               <a:endParaRPr lang="en-US" i="1" dirty="0">
                 <a:latin typeface="Cambria" panose="02040503050406030204" pitchFamily="18" charset="0"/>
@@ -20689,7 +20791,7 @@
           <p:spPr>
             <a:xfrm>
               <a:off x="6380696" y="4005558"/>
-              <a:ext cx="45719" cy="730329"/>
+              <a:ext cx="174497" cy="968215"/>
             </a:xfrm>
             <a:custGeom>
               <a:avLst/>
@@ -20992,8 +21094,8 @@
           </p:nvSpPr>
           <p:spPr>
             <a:xfrm>
-              <a:off x="5940152" y="3361091"/>
-              <a:ext cx="1152128" cy="369332"/>
+              <a:off x="5868145" y="3361091"/>
+              <a:ext cx="1374096" cy="369332"/>
             </a:xfrm>
             <a:prstGeom prst="rect">
               <a:avLst/>
@@ -21007,10 +21109,10 @@
             <a:lstStyle/>
             <a:p>
               <a:r>
-                <a:rPr lang="en-US" b="1" i="1" dirty="0" smtClean="0">
+                <a:rPr lang="en-US" b="1" i="1" smtClean="0">
                   <a:latin typeface="Cambria" panose="02040503050406030204" pitchFamily="18" charset="0"/>
                 </a:rPr>
-                <a:t>Moving?</a:t>
+                <a:t>Verhuizen?</a:t>
               </a:r>
               <a:endParaRPr lang="en-US" b="1" i="1" dirty="0">
                 <a:latin typeface="Cambria" panose="02040503050406030204" pitchFamily="18" charset="0"/>
@@ -21028,7 +21130,7 @@
         <p:spPr>
           <a:xfrm>
             <a:off x="1524000" y="4507403"/>
-            <a:ext cx="1368152" cy="369332"/>
+            <a:ext cx="1447800" cy="369332"/>
           </a:xfrm>
           <a:prstGeom prst="rect">
             <a:avLst/>
@@ -21042,10 +21144,10 @@
           <a:lstStyle/>
           <a:p>
             <a:r>
-              <a:rPr lang="en-US" b="1" i="1" dirty="0" smtClean="0">
+              <a:rPr lang="en-US" b="1" i="1" smtClean="0">
                 <a:latin typeface="Cambria" panose="02040503050406030204" pitchFamily="18" charset="0"/>
               </a:rPr>
-              <a:t>Life cycle</a:t>
+              <a:t>Levensfases</a:t>
             </a:r>
             <a:endParaRPr lang="en-US" b="1" i="1" dirty="0">
               <a:latin typeface="Cambria" panose="02040503050406030204" pitchFamily="18" charset="0"/>
@@ -21102,54 +21204,9 @@
           <a:chExt cx="0" cy="0"/>
         </a:xfrm>
       </p:grpSpPr>
-      <p:sp>
-        <p:nvSpPr>
-          <p:cNvPr id="2" name="Title 1"/>
-          <p:cNvSpPr>
-            <a:spLocks noGrp="1"/>
-          </p:cNvSpPr>
-          <p:nvPr>
-            <p:ph type="title"/>
-          </p:nvPr>
-        </p:nvSpPr>
-        <p:spPr/>
-        <p:txBody>
-          <a:bodyPr/>
-          <a:lstStyle/>
-          <a:p>
-            <a:r>
-              <a:rPr lang="en-US" dirty="0" smtClean="0"/>
-              <a:t>Model Logic</a:t>
-            </a:r>
-            <a:endParaRPr lang="en-US" dirty="0"/>
-          </a:p>
-        </p:txBody>
-      </p:sp>
-      <p:sp>
-        <p:nvSpPr>
-          <p:cNvPr id="3" name="Content Placeholder 2"/>
-          <p:cNvSpPr>
-            <a:spLocks noGrp="1"/>
-          </p:cNvSpPr>
-          <p:nvPr>
-            <p:ph sz="quarter" idx="1"/>
-          </p:nvPr>
-        </p:nvSpPr>
-        <p:spPr/>
-        <p:txBody>
-          <a:bodyPr/>
-          <a:lstStyle/>
-          <a:p>
-            <a:r>
-              <a:rPr lang="en-US" dirty="0" smtClean="0"/>
-              <a:t>Rule: A household moves to a random city for which its ‘Attractiveness’ &gt; ‘Resistance to move’</a:t>
-            </a:r>
-          </a:p>
-        </p:txBody>
-      </p:sp>
       <p:pic>
         <p:nvPicPr>
-          <p:cNvPr id="66" name="Picture 65"/>
+          <p:cNvPr id="4" name="Afbeelding 3"/>
           <p:cNvPicPr>
             <a:picLocks noChangeAspect="1"/>
           </p:cNvPicPr>
@@ -21169,14 +21226,66 @@
         </p:blipFill>
         <p:spPr>
           <a:xfrm>
-            <a:off x="457200" y="2895600"/>
-            <a:ext cx="7467600" cy="2970981"/>
+            <a:off x="152400" y="2770687"/>
+            <a:ext cx="8534400" cy="3553914"/>
           </a:xfrm>
           <a:prstGeom prst="rect">
             <a:avLst/>
           </a:prstGeom>
         </p:spPr>
       </p:pic>
+      <p:sp>
+        <p:nvSpPr>
+          <p:cNvPr id="2" name="Title 1"/>
+          <p:cNvSpPr>
+            <a:spLocks noGrp="1"/>
+          </p:cNvSpPr>
+          <p:nvPr>
+            <p:ph type="title"/>
+          </p:nvPr>
+        </p:nvSpPr>
+        <p:spPr/>
+        <p:txBody>
+          <a:bodyPr/>
+          <a:lstStyle/>
+          <a:p>
+            <a:r>
+              <a:rPr lang="en-US" smtClean="0"/>
+              <a:t>Model </a:t>
+            </a:r>
+            <a:r>
+              <a:rPr lang="en-US" smtClean="0"/>
+              <a:t>Opbouw</a:t>
+            </a:r>
+            <a:endParaRPr lang="en-US" dirty="0"/>
+          </a:p>
+        </p:txBody>
+      </p:sp>
+      <p:sp>
+        <p:nvSpPr>
+          <p:cNvPr id="3" name="Content Placeholder 2"/>
+          <p:cNvSpPr>
+            <a:spLocks noGrp="1"/>
+          </p:cNvSpPr>
+          <p:nvPr>
+            <p:ph sz="quarter" idx="1"/>
+          </p:nvPr>
+        </p:nvSpPr>
+        <p:spPr/>
+        <p:txBody>
+          <a:bodyPr>
+            <a:normAutofit/>
+          </a:bodyPr>
+          <a:lstStyle/>
+          <a:p>
+            <a:r>
+              <a:rPr lang="en-US" sz="2000" smtClean="0"/>
+              <a:t>Een huishouden verhuist naar een van de steden waarvan de: ‘Aantrekkelijkheid’ &gt; ‘Weerstand tot verhuizen’ van het huishouden</a:t>
+            </a:r>
+            <a:endParaRPr lang="en-US" sz="2000" dirty="0" smtClean="0"/>
+          </a:p>
+        </p:txBody>
+      </p:sp>
     </p:spTree>
     <p:extLst>
       <p:ext uri="{BB962C8B-B14F-4D97-AF65-F5344CB8AC3E}">

</xml_diff>